<commit_message>
updated instruction and interim slides
</commit_message>
<xml_diff>
--- a/experiments/05_forced_choice/images/phone_pictures.pptx
+++ b/experiments/05_forced_choice/images/phone_pictures.pptx
@@ -9412,10 +9412,10 @@
       </p:grpSpPr>
       <p:grpSp>
         <p:nvGrpSpPr>
-          <p:cNvPr id="44" name="Group 43">
+          <p:cNvPr id="6" name="Group 5">
             <a:extLst>
               <a:ext uri="{FF2B5EF4-FFF2-40B4-BE49-F238E27FC236}">
-                <a16:creationId xmlns:a16="http://schemas.microsoft.com/office/drawing/2014/main" id="{C661D8B6-AD13-8F49-B4EF-97275ABF98CE}"/>
+                <a16:creationId xmlns:a16="http://schemas.microsoft.com/office/drawing/2014/main" id="{1FA3D4A5-B3DC-754A-BFD2-1005A4305402}"/>
               </a:ext>
             </a:extLst>
           </p:cNvPr>
@@ -9424,484 +9424,557 @@
         </p:nvGrpSpPr>
         <p:grpSpPr>
           <a:xfrm>
-            <a:off x="896112" y="436557"/>
-            <a:ext cx="2944042" cy="5693107"/>
-            <a:chOff x="61787" y="404755"/>
-            <a:chExt cx="2944042" cy="5693107"/>
+            <a:off x="896112" y="436556"/>
+            <a:ext cx="2944042" cy="5693108"/>
+            <a:chOff x="896112" y="436556"/>
+            <a:chExt cx="2944042" cy="5693108"/>
           </a:xfrm>
         </p:grpSpPr>
-        <p:sp>
-          <p:nvSpPr>
-            <p:cNvPr id="45" name="Rounded Rectangle 44">
-              <a:extLst>
-                <a:ext uri="{FF2B5EF4-FFF2-40B4-BE49-F238E27FC236}">
-                  <a16:creationId xmlns:a16="http://schemas.microsoft.com/office/drawing/2014/main" id="{14EDB1EB-8A08-9642-A68A-3D29EB9F0761}"/>
-                </a:ext>
-              </a:extLst>
-            </p:cNvPr>
-            <p:cNvSpPr/>
-            <p:nvPr/>
-          </p:nvSpPr>
-          <p:spPr>
-            <a:xfrm>
-              <a:off x="96608" y="404755"/>
-              <a:ext cx="2875265" cy="5693107"/>
-            </a:xfrm>
-            <a:prstGeom prst="roundRect">
-              <a:avLst/>
-            </a:prstGeom>
-            <a:solidFill>
-              <a:schemeClr val="tx1"/>
-            </a:solidFill>
-            <a:ln>
+        <p:grpSp>
+          <p:nvGrpSpPr>
+            <p:cNvPr id="44" name="Group 43">
+              <a:extLst>
+                <a:ext uri="{FF2B5EF4-FFF2-40B4-BE49-F238E27FC236}">
+                  <a16:creationId xmlns:a16="http://schemas.microsoft.com/office/drawing/2014/main" id="{C661D8B6-AD13-8F49-B4EF-97275ABF98CE}"/>
+                </a:ext>
+              </a:extLst>
+            </p:cNvPr>
+            <p:cNvGrpSpPr/>
+            <p:nvPr/>
+          </p:nvGrpSpPr>
+          <p:grpSpPr>
+            <a:xfrm>
+              <a:off x="896112" y="436557"/>
+              <a:ext cx="2944042" cy="5693107"/>
+              <a:chOff x="61787" y="404755"/>
+              <a:chExt cx="2944042" cy="5693107"/>
+            </a:xfrm>
+          </p:grpSpPr>
+          <p:sp>
+            <p:nvSpPr>
+              <p:cNvPr id="45" name="Rounded Rectangle 44">
+                <a:extLst>
+                  <a:ext uri="{FF2B5EF4-FFF2-40B4-BE49-F238E27FC236}">
+                    <a16:creationId xmlns:a16="http://schemas.microsoft.com/office/drawing/2014/main" id="{14EDB1EB-8A08-9642-A68A-3D29EB9F0761}"/>
+                  </a:ext>
+                </a:extLst>
+              </p:cNvPr>
+              <p:cNvSpPr/>
+              <p:nvPr/>
+            </p:nvSpPr>
+            <p:spPr>
+              <a:xfrm>
+                <a:off x="96608" y="404755"/>
+                <a:ext cx="2875265" cy="5693107"/>
+              </a:xfrm>
+              <a:prstGeom prst="roundRect">
+                <a:avLst/>
+              </a:prstGeom>
               <a:solidFill>
                 <a:schemeClr val="tx1"/>
               </a:solidFill>
-            </a:ln>
-          </p:spPr>
-          <p:style>
-            <a:lnRef idx="2">
-              <a:schemeClr val="accent1">
-                <a:shade val="50000"/>
-              </a:schemeClr>
-            </a:lnRef>
-            <a:fillRef idx="1">
-              <a:schemeClr val="accent1"/>
-            </a:fillRef>
-            <a:effectRef idx="0">
-              <a:schemeClr val="accent1"/>
-            </a:effectRef>
-            <a:fontRef idx="minor">
-              <a:schemeClr val="lt1"/>
-            </a:fontRef>
-          </p:style>
-          <p:txBody>
-            <a:bodyPr rtlCol="0" anchor="ctr"/>
-            <a:lstStyle/>
-            <a:p>
-              <a:pPr algn="ctr"/>
-              <a:endParaRPr lang="en-US"/>
-            </a:p>
-          </p:txBody>
-        </p:sp>
-        <p:sp>
-          <p:nvSpPr>
-            <p:cNvPr id="46" name="Rounded Rectangle 45">
-              <a:extLst>
-                <a:ext uri="{FF2B5EF4-FFF2-40B4-BE49-F238E27FC236}">
-                  <a16:creationId xmlns:a16="http://schemas.microsoft.com/office/drawing/2014/main" id="{5E52F745-13B3-8344-A1B0-43D84FFF72FE}"/>
-                </a:ext>
-              </a:extLst>
-            </p:cNvPr>
-            <p:cNvSpPr/>
-            <p:nvPr/>
-          </p:nvSpPr>
-          <p:spPr>
-            <a:xfrm>
-              <a:off x="192561" y="498764"/>
-              <a:ext cx="2682494" cy="5510463"/>
-            </a:xfrm>
-            <a:prstGeom prst="roundRect">
-              <a:avLst/>
-            </a:prstGeom>
-            <a:solidFill>
-              <a:schemeClr val="bg1"/>
-            </a:solidFill>
-            <a:ln>
+              <a:ln>
+                <a:solidFill>
+                  <a:schemeClr val="tx1"/>
+                </a:solidFill>
+              </a:ln>
+            </p:spPr>
+            <p:style>
+              <a:lnRef idx="2">
+                <a:schemeClr val="accent1">
+                  <a:shade val="50000"/>
+                </a:schemeClr>
+              </a:lnRef>
+              <a:fillRef idx="1">
+                <a:schemeClr val="accent1"/>
+              </a:fillRef>
+              <a:effectRef idx="0">
+                <a:schemeClr val="accent1"/>
+              </a:effectRef>
+              <a:fontRef idx="minor">
+                <a:schemeClr val="lt1"/>
+              </a:fontRef>
+            </p:style>
+            <p:txBody>
+              <a:bodyPr rtlCol="0" anchor="ctr"/>
+              <a:lstStyle/>
+              <a:p>
+                <a:pPr algn="ctr"/>
+                <a:endParaRPr lang="en-US"/>
+              </a:p>
+            </p:txBody>
+          </p:sp>
+          <p:sp>
+            <p:nvSpPr>
+              <p:cNvPr id="46" name="Rounded Rectangle 45">
+                <a:extLst>
+                  <a:ext uri="{FF2B5EF4-FFF2-40B4-BE49-F238E27FC236}">
+                    <a16:creationId xmlns:a16="http://schemas.microsoft.com/office/drawing/2014/main" id="{5E52F745-13B3-8344-A1B0-43D84FFF72FE}"/>
+                  </a:ext>
+                </a:extLst>
+              </p:cNvPr>
+              <p:cNvSpPr/>
+              <p:nvPr/>
+            </p:nvSpPr>
+            <p:spPr>
+              <a:xfrm>
+                <a:off x="192561" y="498764"/>
+                <a:ext cx="2682494" cy="5510463"/>
+              </a:xfrm>
+              <a:prstGeom prst="roundRect">
+                <a:avLst/>
+              </a:prstGeom>
+              <a:solidFill>
+                <a:schemeClr val="bg1"/>
+              </a:solidFill>
+              <a:ln>
+                <a:solidFill>
+                  <a:schemeClr val="tx1"/>
+                </a:solidFill>
+              </a:ln>
+            </p:spPr>
+            <p:style>
+              <a:lnRef idx="2">
+                <a:schemeClr val="accent1">
+                  <a:shade val="50000"/>
+                </a:schemeClr>
+              </a:lnRef>
+              <a:fillRef idx="1">
+                <a:schemeClr val="accent1"/>
+              </a:fillRef>
+              <a:effectRef idx="0">
+                <a:schemeClr val="accent1"/>
+              </a:effectRef>
+              <a:fontRef idx="minor">
+                <a:schemeClr val="lt1"/>
+              </a:fontRef>
+            </p:style>
+            <p:txBody>
+              <a:bodyPr rtlCol="0" anchor="ctr"/>
+              <a:lstStyle/>
+              <a:p>
+                <a:pPr algn="ctr"/>
+                <a:endParaRPr lang="en-US"/>
+              </a:p>
+            </p:txBody>
+          </p:sp>
+          <p:sp>
+            <p:nvSpPr>
+              <p:cNvPr id="47" name="Rounded Rectangle 46">
+                <a:extLst>
+                  <a:ext uri="{FF2B5EF4-FFF2-40B4-BE49-F238E27FC236}">
+                    <a16:creationId xmlns:a16="http://schemas.microsoft.com/office/drawing/2014/main" id="{803A0F58-5F3A-9B4F-83E4-63021D220D14}"/>
+                  </a:ext>
+                </a:extLst>
+              </p:cNvPr>
+              <p:cNvSpPr/>
+              <p:nvPr/>
+            </p:nvSpPr>
+            <p:spPr>
+              <a:xfrm>
+                <a:off x="967495" y="441175"/>
+                <a:ext cx="1132625" cy="326101"/>
+              </a:xfrm>
+              <a:prstGeom prst="roundRect">
+                <a:avLst>
+                  <a:gd name="adj" fmla="val 41146"/>
+                </a:avLst>
+              </a:prstGeom>
               <a:solidFill>
                 <a:schemeClr val="tx1"/>
               </a:solidFill>
-            </a:ln>
-          </p:spPr>
-          <p:style>
-            <a:lnRef idx="2">
-              <a:schemeClr val="accent1">
-                <a:shade val="50000"/>
-              </a:schemeClr>
-            </a:lnRef>
-            <a:fillRef idx="1">
-              <a:schemeClr val="accent1"/>
-            </a:fillRef>
-            <a:effectRef idx="0">
-              <a:schemeClr val="accent1"/>
-            </a:effectRef>
-            <a:fontRef idx="minor">
-              <a:schemeClr val="lt1"/>
-            </a:fontRef>
-          </p:style>
-          <p:txBody>
-            <a:bodyPr rtlCol="0" anchor="ctr"/>
-            <a:lstStyle/>
-            <a:p>
-              <a:pPr algn="ctr"/>
-              <a:endParaRPr lang="en-US"/>
-            </a:p>
-          </p:txBody>
-        </p:sp>
-        <p:sp>
-          <p:nvSpPr>
-            <p:cNvPr id="47" name="Rounded Rectangle 46">
-              <a:extLst>
-                <a:ext uri="{FF2B5EF4-FFF2-40B4-BE49-F238E27FC236}">
-                  <a16:creationId xmlns:a16="http://schemas.microsoft.com/office/drawing/2014/main" id="{803A0F58-5F3A-9B4F-83E4-63021D220D14}"/>
-                </a:ext>
-              </a:extLst>
-            </p:cNvPr>
-            <p:cNvSpPr/>
-            <p:nvPr/>
-          </p:nvSpPr>
-          <p:spPr>
-            <a:xfrm>
-              <a:off x="967495" y="441175"/>
-              <a:ext cx="1132625" cy="326101"/>
-            </a:xfrm>
-            <a:prstGeom prst="roundRect">
-              <a:avLst>
-                <a:gd name="adj" fmla="val 41146"/>
-              </a:avLst>
-            </a:prstGeom>
-            <a:solidFill>
-              <a:schemeClr val="tx1"/>
-            </a:solidFill>
-            <a:ln>
+              <a:ln>
+                <a:solidFill>
+                  <a:schemeClr val="tx1"/>
+                </a:solidFill>
+              </a:ln>
+            </p:spPr>
+            <p:style>
+              <a:lnRef idx="2">
+                <a:schemeClr val="accent1">
+                  <a:shade val="50000"/>
+                </a:schemeClr>
+              </a:lnRef>
+              <a:fillRef idx="1">
+                <a:schemeClr val="accent1"/>
+              </a:fillRef>
+              <a:effectRef idx="0">
+                <a:schemeClr val="accent1"/>
+              </a:effectRef>
+              <a:fontRef idx="minor">
+                <a:schemeClr val="lt1"/>
+              </a:fontRef>
+            </p:style>
+            <p:txBody>
+              <a:bodyPr rtlCol="0" anchor="ctr"/>
+              <a:lstStyle/>
+              <a:p>
+                <a:pPr algn="ctr"/>
+                <a:endParaRPr lang="en-US"/>
+              </a:p>
+            </p:txBody>
+          </p:sp>
+          <p:sp>
+            <p:nvSpPr>
+              <p:cNvPr id="48" name="Rounded Rectangle 47">
+                <a:extLst>
+                  <a:ext uri="{FF2B5EF4-FFF2-40B4-BE49-F238E27FC236}">
+                    <a16:creationId xmlns:a16="http://schemas.microsoft.com/office/drawing/2014/main" id="{C10DBF82-EB8E-EF40-9368-87D09B7F514B}"/>
+                  </a:ext>
+                </a:extLst>
+              </p:cNvPr>
+              <p:cNvSpPr/>
+              <p:nvPr/>
+            </p:nvSpPr>
+            <p:spPr>
+              <a:xfrm>
+                <a:off x="967495" y="431974"/>
+                <a:ext cx="1132625" cy="172251"/>
+              </a:xfrm>
+              <a:prstGeom prst="roundRect">
+                <a:avLst>
+                  <a:gd name="adj" fmla="val 0"/>
+                </a:avLst>
+              </a:prstGeom>
               <a:solidFill>
                 <a:schemeClr val="tx1"/>
               </a:solidFill>
-            </a:ln>
-          </p:spPr>
-          <p:style>
-            <a:lnRef idx="2">
-              <a:schemeClr val="accent1">
-                <a:shade val="50000"/>
-              </a:schemeClr>
-            </a:lnRef>
-            <a:fillRef idx="1">
-              <a:schemeClr val="accent1"/>
-            </a:fillRef>
-            <a:effectRef idx="0">
-              <a:schemeClr val="accent1"/>
-            </a:effectRef>
-            <a:fontRef idx="minor">
-              <a:schemeClr val="lt1"/>
-            </a:fontRef>
-          </p:style>
-          <p:txBody>
-            <a:bodyPr rtlCol="0" anchor="ctr"/>
-            <a:lstStyle/>
-            <a:p>
-              <a:pPr algn="ctr"/>
-              <a:endParaRPr lang="en-US"/>
-            </a:p>
-          </p:txBody>
-        </p:sp>
-        <p:sp>
-          <p:nvSpPr>
-            <p:cNvPr id="48" name="Rounded Rectangle 47">
-              <a:extLst>
-                <a:ext uri="{FF2B5EF4-FFF2-40B4-BE49-F238E27FC236}">
-                  <a16:creationId xmlns:a16="http://schemas.microsoft.com/office/drawing/2014/main" id="{C10DBF82-EB8E-EF40-9368-87D09B7F514B}"/>
-                </a:ext>
-              </a:extLst>
-            </p:cNvPr>
-            <p:cNvSpPr/>
-            <p:nvPr/>
-          </p:nvSpPr>
-          <p:spPr>
-            <a:xfrm>
-              <a:off x="967495" y="431974"/>
-              <a:ext cx="1132625" cy="172251"/>
-            </a:xfrm>
-            <a:prstGeom prst="roundRect">
-              <a:avLst>
-                <a:gd name="adj" fmla="val 0"/>
-              </a:avLst>
-            </a:prstGeom>
-            <a:solidFill>
-              <a:schemeClr val="tx1"/>
-            </a:solidFill>
-            <a:ln>
+              <a:ln>
+                <a:solidFill>
+                  <a:schemeClr val="tx1"/>
+                </a:solidFill>
+              </a:ln>
+            </p:spPr>
+            <p:style>
+              <a:lnRef idx="2">
+                <a:schemeClr val="accent1">
+                  <a:shade val="50000"/>
+                </a:schemeClr>
+              </a:lnRef>
+              <a:fillRef idx="1">
+                <a:schemeClr val="accent1"/>
+              </a:fillRef>
+              <a:effectRef idx="0">
+                <a:schemeClr val="accent1"/>
+              </a:effectRef>
+              <a:fontRef idx="minor">
+                <a:schemeClr val="lt1"/>
+              </a:fontRef>
+            </p:style>
+            <p:txBody>
+              <a:bodyPr rtlCol="0" anchor="ctr"/>
+              <a:lstStyle/>
+              <a:p>
+                <a:pPr algn="ctr"/>
+                <a:endParaRPr lang="en-US"/>
+              </a:p>
+            </p:txBody>
+          </p:sp>
+          <p:sp>
+            <p:nvSpPr>
+              <p:cNvPr id="49" name="TextBox 48">
+                <a:extLst>
+                  <a:ext uri="{FF2B5EF4-FFF2-40B4-BE49-F238E27FC236}">
+                    <a16:creationId xmlns:a16="http://schemas.microsoft.com/office/drawing/2014/main" id="{E900CD87-815D-D54E-BBB9-56EE9B434648}"/>
+                  </a:ext>
+                </a:extLst>
+              </p:cNvPr>
+              <p:cNvSpPr txBox="1"/>
+              <p:nvPr/>
+            </p:nvSpPr>
+            <p:spPr>
+              <a:xfrm>
+                <a:off x="292122" y="1490782"/>
+                <a:ext cx="2463800" cy="1384995"/>
+              </a:xfrm>
+              <a:prstGeom prst="rect">
+                <a:avLst/>
+              </a:prstGeom>
+              <a:noFill/>
+            </p:spPr>
+            <p:txBody>
+              <a:bodyPr wrap="square" rtlCol="0">
+                <a:spAutoFit/>
+              </a:bodyPr>
+              <a:lstStyle/>
+              <a:p>
+                <a:r>
+                  <a:rPr lang="en-US" sz="2800" dirty="0">
+                    <a:latin typeface="Times" pitchFamily="2" charset="0"/>
+                  </a:rPr>
+                  <a:t>rest. 1:         yes</a:t>
+                </a:r>
+              </a:p>
+              <a:p>
+                <a:r>
+                  <a:rPr lang="en-US" sz="2800" dirty="0">
+                    <a:latin typeface="Times" pitchFamily="2" charset="0"/>
+                  </a:rPr>
+                  <a:t>rest. 2:          no</a:t>
+                </a:r>
+              </a:p>
+              <a:p>
+                <a:r>
+                  <a:rPr lang="en-US" sz="2800" dirty="0">
+                    <a:latin typeface="Times" pitchFamily="2" charset="0"/>
+                  </a:rPr>
+                  <a:t>rest. 3:         yes</a:t>
+                </a:r>
+              </a:p>
+            </p:txBody>
+          </p:sp>
+          <p:sp>
+            <p:nvSpPr>
+              <p:cNvPr id="50" name="Rounded Rectangle 49">
+                <a:extLst>
+                  <a:ext uri="{FF2B5EF4-FFF2-40B4-BE49-F238E27FC236}">
+                    <a16:creationId xmlns:a16="http://schemas.microsoft.com/office/drawing/2014/main" id="{8BC469F0-D055-6D48-BBA6-9E2CA6E13398}"/>
+                  </a:ext>
+                </a:extLst>
+              </p:cNvPr>
+              <p:cNvSpPr/>
+              <p:nvPr/>
+            </p:nvSpPr>
+            <p:spPr>
+              <a:xfrm>
+                <a:off x="61787" y="1364087"/>
+                <a:ext cx="119627" cy="326101"/>
+              </a:xfrm>
+              <a:prstGeom prst="roundRect">
+                <a:avLst>
+                  <a:gd name="adj" fmla="val 41146"/>
+                </a:avLst>
+              </a:prstGeom>
               <a:solidFill>
                 <a:schemeClr val="tx1"/>
               </a:solidFill>
-            </a:ln>
-          </p:spPr>
-          <p:style>
-            <a:lnRef idx="2">
-              <a:schemeClr val="accent1">
-                <a:shade val="50000"/>
-              </a:schemeClr>
-            </a:lnRef>
-            <a:fillRef idx="1">
-              <a:schemeClr val="accent1"/>
-            </a:fillRef>
-            <a:effectRef idx="0">
-              <a:schemeClr val="accent1"/>
-            </a:effectRef>
-            <a:fontRef idx="minor">
-              <a:schemeClr val="lt1"/>
-            </a:fontRef>
-          </p:style>
-          <p:txBody>
-            <a:bodyPr rtlCol="0" anchor="ctr"/>
-            <a:lstStyle/>
-            <a:p>
-              <a:pPr algn="ctr"/>
-              <a:endParaRPr lang="en-US"/>
-            </a:p>
-          </p:txBody>
-        </p:sp>
-        <p:sp>
-          <p:nvSpPr>
-            <p:cNvPr id="49" name="TextBox 48">
-              <a:extLst>
-                <a:ext uri="{FF2B5EF4-FFF2-40B4-BE49-F238E27FC236}">
-                  <a16:creationId xmlns:a16="http://schemas.microsoft.com/office/drawing/2014/main" id="{E900CD87-815D-D54E-BBB9-56EE9B434648}"/>
-                </a:ext>
-              </a:extLst>
-            </p:cNvPr>
-            <p:cNvSpPr txBox="1"/>
-            <p:nvPr/>
-          </p:nvSpPr>
-          <p:spPr>
-            <a:xfrm>
-              <a:off x="292122" y="1490782"/>
-              <a:ext cx="2463800" cy="1384995"/>
+              <a:ln>
+                <a:solidFill>
+                  <a:schemeClr val="tx1"/>
+                </a:solidFill>
+              </a:ln>
+            </p:spPr>
+            <p:style>
+              <a:lnRef idx="2">
+                <a:schemeClr val="accent1">
+                  <a:shade val="50000"/>
+                </a:schemeClr>
+              </a:lnRef>
+              <a:fillRef idx="1">
+                <a:schemeClr val="accent1"/>
+              </a:fillRef>
+              <a:effectRef idx="0">
+                <a:schemeClr val="accent1"/>
+              </a:effectRef>
+              <a:fontRef idx="minor">
+                <a:schemeClr val="lt1"/>
+              </a:fontRef>
+            </p:style>
+            <p:txBody>
+              <a:bodyPr rtlCol="0" anchor="ctr"/>
+              <a:lstStyle/>
+              <a:p>
+                <a:pPr algn="ctr"/>
+                <a:endParaRPr lang="en-US"/>
+              </a:p>
+            </p:txBody>
+          </p:sp>
+          <p:sp>
+            <p:nvSpPr>
+              <p:cNvPr id="51" name="Rounded Rectangle 50">
+                <a:extLst>
+                  <a:ext uri="{FF2B5EF4-FFF2-40B4-BE49-F238E27FC236}">
+                    <a16:creationId xmlns:a16="http://schemas.microsoft.com/office/drawing/2014/main" id="{C317381A-8A74-B047-AD9D-19D7851AAF44}"/>
+                  </a:ext>
+                </a:extLst>
+              </p:cNvPr>
+              <p:cNvSpPr/>
+              <p:nvPr/>
+            </p:nvSpPr>
+            <p:spPr>
+              <a:xfrm>
+                <a:off x="2886202" y="1333751"/>
+                <a:ext cx="119627" cy="326101"/>
+              </a:xfrm>
+              <a:prstGeom prst="roundRect">
+                <a:avLst>
+                  <a:gd name="adj" fmla="val 41146"/>
+                </a:avLst>
+              </a:prstGeom>
+              <a:solidFill>
+                <a:schemeClr val="tx1"/>
+              </a:solidFill>
+              <a:ln>
+                <a:solidFill>
+                  <a:schemeClr val="tx1"/>
+                </a:solidFill>
+              </a:ln>
+            </p:spPr>
+            <p:style>
+              <a:lnRef idx="2">
+                <a:schemeClr val="accent1">
+                  <a:shade val="50000"/>
+                </a:schemeClr>
+              </a:lnRef>
+              <a:fillRef idx="1">
+                <a:schemeClr val="accent1"/>
+              </a:fillRef>
+              <a:effectRef idx="0">
+                <a:schemeClr val="accent1"/>
+              </a:effectRef>
+              <a:fontRef idx="minor">
+                <a:schemeClr val="lt1"/>
+              </a:fontRef>
+            </p:style>
+            <p:txBody>
+              <a:bodyPr rtlCol="0" anchor="ctr"/>
+              <a:lstStyle/>
+              <a:p>
+                <a:pPr algn="ctr"/>
+                <a:endParaRPr lang="en-US"/>
+              </a:p>
+            </p:txBody>
+          </p:sp>
+          <p:sp>
+            <p:nvSpPr>
+              <p:cNvPr id="52" name="Rounded Rectangle 51">
+                <a:extLst>
+                  <a:ext uri="{FF2B5EF4-FFF2-40B4-BE49-F238E27FC236}">
+                    <a16:creationId xmlns:a16="http://schemas.microsoft.com/office/drawing/2014/main" id="{CAB2B5C6-0307-954C-8066-86F0EEDB73CF}"/>
+                  </a:ext>
+                </a:extLst>
+              </p:cNvPr>
+              <p:cNvSpPr/>
+              <p:nvPr/>
+            </p:nvSpPr>
+            <p:spPr>
+              <a:xfrm>
+                <a:off x="2886202" y="1742570"/>
+                <a:ext cx="119627" cy="326101"/>
+              </a:xfrm>
+              <a:prstGeom prst="roundRect">
+                <a:avLst>
+                  <a:gd name="adj" fmla="val 41146"/>
+                </a:avLst>
+              </a:prstGeom>
+              <a:solidFill>
+                <a:schemeClr val="tx1"/>
+              </a:solidFill>
+              <a:ln>
+                <a:solidFill>
+                  <a:schemeClr val="tx1"/>
+                </a:solidFill>
+              </a:ln>
+            </p:spPr>
+            <p:style>
+              <a:lnRef idx="2">
+                <a:schemeClr val="accent1">
+                  <a:shade val="50000"/>
+                </a:schemeClr>
+              </a:lnRef>
+              <a:fillRef idx="1">
+                <a:schemeClr val="accent1"/>
+              </a:fillRef>
+              <a:effectRef idx="0">
+                <a:schemeClr val="accent1"/>
+              </a:effectRef>
+              <a:fontRef idx="minor">
+                <a:schemeClr val="lt1"/>
+              </a:fontRef>
+            </p:style>
+            <p:txBody>
+              <a:bodyPr rtlCol="0" anchor="ctr"/>
+              <a:lstStyle/>
+              <a:p>
+                <a:pPr algn="ctr"/>
+                <a:endParaRPr lang="en-US"/>
+              </a:p>
+            </p:txBody>
+          </p:sp>
+          <p:sp>
+            <p:nvSpPr>
+              <p:cNvPr id="53" name="Rounded Rectangle 52">
+                <a:extLst>
+                  <a:ext uri="{FF2B5EF4-FFF2-40B4-BE49-F238E27FC236}">
+                    <a16:creationId xmlns:a16="http://schemas.microsoft.com/office/drawing/2014/main" id="{23D81C57-BD90-B249-8B53-5EC9E0134B85}"/>
+                  </a:ext>
+                </a:extLst>
+              </p:cNvPr>
+              <p:cNvSpPr/>
+              <p:nvPr/>
+            </p:nvSpPr>
+            <p:spPr>
+              <a:xfrm>
+                <a:off x="335417" y="971905"/>
+                <a:ext cx="2396779" cy="279975"/>
+              </a:xfrm>
+              <a:prstGeom prst="roundRect">
+                <a:avLst>
+                  <a:gd name="adj" fmla="val 50000"/>
+                </a:avLst>
+              </a:prstGeom>
+              <a:solidFill>
+                <a:schemeClr val="tx2">
+                  <a:lumMod val="20000"/>
+                  <a:lumOff val="80000"/>
+                </a:schemeClr>
+              </a:solidFill>
+              <a:ln>
+                <a:solidFill>
+                  <a:schemeClr val="tx1"/>
+                </a:solidFill>
+              </a:ln>
+            </p:spPr>
+            <p:style>
+              <a:lnRef idx="2">
+                <a:schemeClr val="accent1">
+                  <a:shade val="50000"/>
+                </a:schemeClr>
+              </a:lnRef>
+              <a:fillRef idx="1">
+                <a:schemeClr val="accent1"/>
+              </a:fillRef>
+              <a:effectRef idx="0">
+                <a:schemeClr val="accent1"/>
+              </a:effectRef>
+              <a:fontRef idx="minor">
+                <a:schemeClr val="lt1"/>
+              </a:fontRef>
+            </p:style>
+            <p:txBody>
+              <a:bodyPr rtlCol="0" anchor="ctr"/>
+              <a:lstStyle/>
+              <a:p>
+                <a:pPr algn="ctr"/>
+                <a:endParaRPr lang="en-US"/>
+              </a:p>
+            </p:txBody>
+          </p:sp>
+        </p:grpSp>
+        <p:sp>
+          <p:nvSpPr>
+            <p:cNvPr id="5" name="Rectangle 4">
+              <a:extLst>
+                <a:ext uri="{FF2B5EF4-FFF2-40B4-BE49-F238E27FC236}">
+                  <a16:creationId xmlns:a16="http://schemas.microsoft.com/office/drawing/2014/main" id="{D8F5E2B0-7502-0B44-8469-DA20A4BA4E71}"/>
+                </a:ext>
+              </a:extLst>
+            </p:cNvPr>
+            <p:cNvSpPr/>
+            <p:nvPr/>
+          </p:nvSpPr>
+          <p:spPr>
+            <a:xfrm>
+              <a:off x="896112" y="436556"/>
+              <a:ext cx="2944042" cy="5693108"/>
             </a:xfrm>
             <a:prstGeom prst="rect">
               <a:avLst/>
             </a:prstGeom>
             <a:noFill/>
-          </p:spPr>
-          <p:txBody>
-            <a:bodyPr wrap="square" rtlCol="0">
-              <a:spAutoFit/>
-            </a:bodyPr>
-            <a:lstStyle/>
-            <a:p>
-              <a:r>
-                <a:rPr lang="en-US" sz="2800" dirty="0">
-                  <a:latin typeface="Times" pitchFamily="2" charset="0"/>
-                </a:rPr>
-                <a:t>rest. 1:         yes</a:t>
-              </a:r>
-            </a:p>
-            <a:p>
-              <a:r>
-                <a:rPr lang="en-US" sz="2800" dirty="0">
-                  <a:latin typeface="Times" pitchFamily="2" charset="0"/>
-                </a:rPr>
-                <a:t>rest. 2:          no</a:t>
-              </a:r>
-            </a:p>
-            <a:p>
-              <a:r>
-                <a:rPr lang="en-US" sz="2800" dirty="0">
-                  <a:latin typeface="Times" pitchFamily="2" charset="0"/>
-                </a:rPr>
-                <a:t>rest. 3:         yes</a:t>
-              </a:r>
-            </a:p>
-          </p:txBody>
-        </p:sp>
-        <p:sp>
-          <p:nvSpPr>
-            <p:cNvPr id="50" name="Rounded Rectangle 49">
-              <a:extLst>
-                <a:ext uri="{FF2B5EF4-FFF2-40B4-BE49-F238E27FC236}">
-                  <a16:creationId xmlns:a16="http://schemas.microsoft.com/office/drawing/2014/main" id="{8BC469F0-D055-6D48-BBA6-9E2CA6E13398}"/>
-                </a:ext>
-              </a:extLst>
-            </p:cNvPr>
-            <p:cNvSpPr/>
-            <p:nvPr/>
-          </p:nvSpPr>
-          <p:spPr>
-            <a:xfrm>
-              <a:off x="61787" y="1364087"/>
-              <a:ext cx="119627" cy="326101"/>
-            </a:xfrm>
-            <a:prstGeom prst="roundRect">
-              <a:avLst>
-                <a:gd name="adj" fmla="val 41146"/>
-              </a:avLst>
-            </a:prstGeom>
-            <a:solidFill>
-              <a:schemeClr val="tx1"/>
-            </a:solidFill>
-            <a:ln>
-              <a:solidFill>
-                <a:schemeClr val="tx1"/>
-              </a:solidFill>
-            </a:ln>
-          </p:spPr>
-          <p:style>
-            <a:lnRef idx="2">
-              <a:schemeClr val="accent1">
-                <a:shade val="50000"/>
-              </a:schemeClr>
-            </a:lnRef>
-            <a:fillRef idx="1">
-              <a:schemeClr val="accent1"/>
-            </a:fillRef>
-            <a:effectRef idx="0">
-              <a:schemeClr val="accent1"/>
-            </a:effectRef>
-            <a:fontRef idx="minor">
-              <a:schemeClr val="lt1"/>
-            </a:fontRef>
-          </p:style>
-          <p:txBody>
-            <a:bodyPr rtlCol="0" anchor="ctr"/>
-            <a:lstStyle/>
-            <a:p>
-              <a:pPr algn="ctr"/>
-              <a:endParaRPr lang="en-US"/>
-            </a:p>
-          </p:txBody>
-        </p:sp>
-        <p:sp>
-          <p:nvSpPr>
-            <p:cNvPr id="51" name="Rounded Rectangle 50">
-              <a:extLst>
-                <a:ext uri="{FF2B5EF4-FFF2-40B4-BE49-F238E27FC236}">
-                  <a16:creationId xmlns:a16="http://schemas.microsoft.com/office/drawing/2014/main" id="{C317381A-8A74-B047-AD9D-19D7851AAF44}"/>
-                </a:ext>
-              </a:extLst>
-            </p:cNvPr>
-            <p:cNvSpPr/>
-            <p:nvPr/>
-          </p:nvSpPr>
-          <p:spPr>
-            <a:xfrm>
-              <a:off x="2886202" y="1333751"/>
-              <a:ext cx="119627" cy="326101"/>
-            </a:xfrm>
-            <a:prstGeom prst="roundRect">
-              <a:avLst>
-                <a:gd name="adj" fmla="val 41146"/>
-              </a:avLst>
-            </a:prstGeom>
-            <a:solidFill>
-              <a:schemeClr val="tx1"/>
-            </a:solidFill>
-            <a:ln>
-              <a:solidFill>
-                <a:schemeClr val="tx1"/>
-              </a:solidFill>
-            </a:ln>
-          </p:spPr>
-          <p:style>
-            <a:lnRef idx="2">
-              <a:schemeClr val="accent1">
-                <a:shade val="50000"/>
-              </a:schemeClr>
-            </a:lnRef>
-            <a:fillRef idx="1">
-              <a:schemeClr val="accent1"/>
-            </a:fillRef>
-            <a:effectRef idx="0">
-              <a:schemeClr val="accent1"/>
-            </a:effectRef>
-            <a:fontRef idx="minor">
-              <a:schemeClr val="lt1"/>
-            </a:fontRef>
-          </p:style>
-          <p:txBody>
-            <a:bodyPr rtlCol="0" anchor="ctr"/>
-            <a:lstStyle/>
-            <a:p>
-              <a:pPr algn="ctr"/>
-              <a:endParaRPr lang="en-US"/>
-            </a:p>
-          </p:txBody>
-        </p:sp>
-        <p:sp>
-          <p:nvSpPr>
-            <p:cNvPr id="52" name="Rounded Rectangle 51">
-              <a:extLst>
-                <a:ext uri="{FF2B5EF4-FFF2-40B4-BE49-F238E27FC236}">
-                  <a16:creationId xmlns:a16="http://schemas.microsoft.com/office/drawing/2014/main" id="{CAB2B5C6-0307-954C-8066-86F0EEDB73CF}"/>
-                </a:ext>
-              </a:extLst>
-            </p:cNvPr>
-            <p:cNvSpPr/>
-            <p:nvPr/>
-          </p:nvSpPr>
-          <p:spPr>
-            <a:xfrm>
-              <a:off x="2886202" y="1742570"/>
-              <a:ext cx="119627" cy="326101"/>
-            </a:xfrm>
-            <a:prstGeom prst="roundRect">
-              <a:avLst>
-                <a:gd name="adj" fmla="val 41146"/>
-              </a:avLst>
-            </a:prstGeom>
-            <a:solidFill>
-              <a:schemeClr val="tx1"/>
-            </a:solidFill>
-            <a:ln>
-              <a:solidFill>
-                <a:schemeClr val="tx1"/>
-              </a:solidFill>
-            </a:ln>
-          </p:spPr>
-          <p:style>
-            <a:lnRef idx="2">
-              <a:schemeClr val="accent1">
-                <a:shade val="50000"/>
-              </a:schemeClr>
-            </a:lnRef>
-            <a:fillRef idx="1">
-              <a:schemeClr val="accent1"/>
-            </a:fillRef>
-            <a:effectRef idx="0">
-              <a:schemeClr val="accent1"/>
-            </a:effectRef>
-            <a:fontRef idx="minor">
-              <a:schemeClr val="lt1"/>
-            </a:fontRef>
-          </p:style>
-          <p:txBody>
-            <a:bodyPr rtlCol="0" anchor="ctr"/>
-            <a:lstStyle/>
-            <a:p>
-              <a:pPr algn="ctr"/>
-              <a:endParaRPr lang="en-US"/>
-            </a:p>
-          </p:txBody>
-        </p:sp>
-        <p:sp>
-          <p:nvSpPr>
-            <p:cNvPr id="53" name="Rounded Rectangle 52">
-              <a:extLst>
-                <a:ext uri="{FF2B5EF4-FFF2-40B4-BE49-F238E27FC236}">
-                  <a16:creationId xmlns:a16="http://schemas.microsoft.com/office/drawing/2014/main" id="{23D81C57-BD90-B249-8B53-5EC9E0134B85}"/>
-                </a:ext>
-              </a:extLst>
-            </p:cNvPr>
-            <p:cNvSpPr/>
-            <p:nvPr/>
-          </p:nvSpPr>
-          <p:spPr>
-            <a:xfrm>
-              <a:off x="335417" y="971905"/>
-              <a:ext cx="2396779" cy="279975"/>
-            </a:xfrm>
-            <a:prstGeom prst="roundRect">
-              <a:avLst>
-                <a:gd name="adj" fmla="val 50000"/>
-              </a:avLst>
-            </a:prstGeom>
-            <a:solidFill>
-              <a:schemeClr val="tx2">
-                <a:lumMod val="20000"/>
-                <a:lumOff val="80000"/>
-              </a:schemeClr>
-            </a:solidFill>
-            <a:ln>
-              <a:solidFill>
-                <a:schemeClr val="tx1"/>
+            <a:ln w="28575">
+              <a:solidFill>
+                <a:srgbClr val="C00000"/>
               </a:solidFill>
             </a:ln>
           </p:spPr>
@@ -9933,10 +10006,10 @@
       </p:grpSp>
       <p:grpSp>
         <p:nvGrpSpPr>
-          <p:cNvPr id="54" name="Group 53">
+          <p:cNvPr id="7" name="Group 6">
             <a:extLst>
               <a:ext uri="{FF2B5EF4-FFF2-40B4-BE49-F238E27FC236}">
-                <a16:creationId xmlns:a16="http://schemas.microsoft.com/office/drawing/2014/main" id="{72CD5272-4D03-D540-B3A1-1FEFEE0C474C}"/>
+                <a16:creationId xmlns:a16="http://schemas.microsoft.com/office/drawing/2014/main" id="{23E94A7E-9642-714F-A42F-6C6304A6B03F}"/>
               </a:ext>
             </a:extLst>
           </p:cNvPr>
@@ -9945,484 +10018,557 @@
         </p:nvGrpSpPr>
         <p:grpSpPr>
           <a:xfrm>
-            <a:off x="4484314" y="463776"/>
-            <a:ext cx="2944042" cy="5693107"/>
-            <a:chOff x="61787" y="404755"/>
-            <a:chExt cx="2944042" cy="5693107"/>
+            <a:off x="4484314" y="463775"/>
+            <a:ext cx="2947591" cy="5693108"/>
+            <a:chOff x="4484314" y="463775"/>
+            <a:chExt cx="2947591" cy="5693108"/>
           </a:xfrm>
         </p:grpSpPr>
-        <p:sp>
-          <p:nvSpPr>
-            <p:cNvPr id="55" name="Rounded Rectangle 54">
-              <a:extLst>
-                <a:ext uri="{FF2B5EF4-FFF2-40B4-BE49-F238E27FC236}">
-                  <a16:creationId xmlns:a16="http://schemas.microsoft.com/office/drawing/2014/main" id="{95648CCC-9EA7-354F-878A-7AA72D09D423}"/>
-                </a:ext>
-              </a:extLst>
-            </p:cNvPr>
-            <p:cNvSpPr/>
-            <p:nvPr/>
-          </p:nvSpPr>
-          <p:spPr>
-            <a:xfrm>
-              <a:off x="96608" y="404755"/>
-              <a:ext cx="2875265" cy="5693107"/>
-            </a:xfrm>
-            <a:prstGeom prst="roundRect">
-              <a:avLst/>
-            </a:prstGeom>
-            <a:solidFill>
-              <a:schemeClr val="tx1"/>
-            </a:solidFill>
-            <a:ln>
+        <p:grpSp>
+          <p:nvGrpSpPr>
+            <p:cNvPr id="54" name="Group 53">
+              <a:extLst>
+                <a:ext uri="{FF2B5EF4-FFF2-40B4-BE49-F238E27FC236}">
+                  <a16:creationId xmlns:a16="http://schemas.microsoft.com/office/drawing/2014/main" id="{72CD5272-4D03-D540-B3A1-1FEFEE0C474C}"/>
+                </a:ext>
+              </a:extLst>
+            </p:cNvPr>
+            <p:cNvGrpSpPr/>
+            <p:nvPr/>
+          </p:nvGrpSpPr>
+          <p:grpSpPr>
+            <a:xfrm>
+              <a:off x="4484314" y="463776"/>
+              <a:ext cx="2944042" cy="5693107"/>
+              <a:chOff x="61787" y="404755"/>
+              <a:chExt cx="2944042" cy="5693107"/>
+            </a:xfrm>
+          </p:grpSpPr>
+          <p:sp>
+            <p:nvSpPr>
+              <p:cNvPr id="55" name="Rounded Rectangle 54">
+                <a:extLst>
+                  <a:ext uri="{FF2B5EF4-FFF2-40B4-BE49-F238E27FC236}">
+                    <a16:creationId xmlns:a16="http://schemas.microsoft.com/office/drawing/2014/main" id="{95648CCC-9EA7-354F-878A-7AA72D09D423}"/>
+                  </a:ext>
+                </a:extLst>
+              </p:cNvPr>
+              <p:cNvSpPr/>
+              <p:nvPr/>
+            </p:nvSpPr>
+            <p:spPr>
+              <a:xfrm>
+                <a:off x="96608" y="404755"/>
+                <a:ext cx="2875265" cy="5693107"/>
+              </a:xfrm>
+              <a:prstGeom prst="roundRect">
+                <a:avLst/>
+              </a:prstGeom>
               <a:solidFill>
                 <a:schemeClr val="tx1"/>
               </a:solidFill>
-            </a:ln>
-          </p:spPr>
-          <p:style>
-            <a:lnRef idx="2">
-              <a:schemeClr val="accent1">
-                <a:shade val="50000"/>
-              </a:schemeClr>
-            </a:lnRef>
-            <a:fillRef idx="1">
-              <a:schemeClr val="accent1"/>
-            </a:fillRef>
-            <a:effectRef idx="0">
-              <a:schemeClr val="accent1"/>
-            </a:effectRef>
-            <a:fontRef idx="minor">
-              <a:schemeClr val="lt1"/>
-            </a:fontRef>
-          </p:style>
-          <p:txBody>
-            <a:bodyPr rtlCol="0" anchor="ctr"/>
-            <a:lstStyle/>
-            <a:p>
-              <a:pPr algn="ctr"/>
-              <a:endParaRPr lang="en-US"/>
-            </a:p>
-          </p:txBody>
-        </p:sp>
-        <p:sp>
-          <p:nvSpPr>
-            <p:cNvPr id="56" name="Rounded Rectangle 55">
-              <a:extLst>
-                <a:ext uri="{FF2B5EF4-FFF2-40B4-BE49-F238E27FC236}">
-                  <a16:creationId xmlns:a16="http://schemas.microsoft.com/office/drawing/2014/main" id="{2BC646C1-512E-A847-9711-BF0E3737B285}"/>
-                </a:ext>
-              </a:extLst>
-            </p:cNvPr>
-            <p:cNvSpPr/>
-            <p:nvPr/>
-          </p:nvSpPr>
-          <p:spPr>
-            <a:xfrm>
-              <a:off x="192561" y="498764"/>
-              <a:ext cx="2682494" cy="5510463"/>
-            </a:xfrm>
-            <a:prstGeom prst="roundRect">
-              <a:avLst/>
-            </a:prstGeom>
-            <a:solidFill>
-              <a:schemeClr val="bg1"/>
-            </a:solidFill>
-            <a:ln>
+              <a:ln>
+                <a:solidFill>
+                  <a:schemeClr val="tx1"/>
+                </a:solidFill>
+              </a:ln>
+            </p:spPr>
+            <p:style>
+              <a:lnRef idx="2">
+                <a:schemeClr val="accent1">
+                  <a:shade val="50000"/>
+                </a:schemeClr>
+              </a:lnRef>
+              <a:fillRef idx="1">
+                <a:schemeClr val="accent1"/>
+              </a:fillRef>
+              <a:effectRef idx="0">
+                <a:schemeClr val="accent1"/>
+              </a:effectRef>
+              <a:fontRef idx="minor">
+                <a:schemeClr val="lt1"/>
+              </a:fontRef>
+            </p:style>
+            <p:txBody>
+              <a:bodyPr rtlCol="0" anchor="ctr"/>
+              <a:lstStyle/>
+              <a:p>
+                <a:pPr algn="ctr"/>
+                <a:endParaRPr lang="en-US"/>
+              </a:p>
+            </p:txBody>
+          </p:sp>
+          <p:sp>
+            <p:nvSpPr>
+              <p:cNvPr id="56" name="Rounded Rectangle 55">
+                <a:extLst>
+                  <a:ext uri="{FF2B5EF4-FFF2-40B4-BE49-F238E27FC236}">
+                    <a16:creationId xmlns:a16="http://schemas.microsoft.com/office/drawing/2014/main" id="{2BC646C1-512E-A847-9711-BF0E3737B285}"/>
+                  </a:ext>
+                </a:extLst>
+              </p:cNvPr>
+              <p:cNvSpPr/>
+              <p:nvPr/>
+            </p:nvSpPr>
+            <p:spPr>
+              <a:xfrm>
+                <a:off x="192561" y="498764"/>
+                <a:ext cx="2682494" cy="5510463"/>
+              </a:xfrm>
+              <a:prstGeom prst="roundRect">
+                <a:avLst/>
+              </a:prstGeom>
+              <a:solidFill>
+                <a:schemeClr val="bg1"/>
+              </a:solidFill>
+              <a:ln>
+                <a:solidFill>
+                  <a:schemeClr val="tx1"/>
+                </a:solidFill>
+              </a:ln>
+            </p:spPr>
+            <p:style>
+              <a:lnRef idx="2">
+                <a:schemeClr val="accent1">
+                  <a:shade val="50000"/>
+                </a:schemeClr>
+              </a:lnRef>
+              <a:fillRef idx="1">
+                <a:schemeClr val="accent1"/>
+              </a:fillRef>
+              <a:effectRef idx="0">
+                <a:schemeClr val="accent1"/>
+              </a:effectRef>
+              <a:fontRef idx="minor">
+                <a:schemeClr val="lt1"/>
+              </a:fontRef>
+            </p:style>
+            <p:txBody>
+              <a:bodyPr rtlCol="0" anchor="ctr"/>
+              <a:lstStyle/>
+              <a:p>
+                <a:pPr algn="ctr"/>
+                <a:endParaRPr lang="en-US"/>
+              </a:p>
+            </p:txBody>
+          </p:sp>
+          <p:sp>
+            <p:nvSpPr>
+              <p:cNvPr id="57" name="Rounded Rectangle 56">
+                <a:extLst>
+                  <a:ext uri="{FF2B5EF4-FFF2-40B4-BE49-F238E27FC236}">
+                    <a16:creationId xmlns:a16="http://schemas.microsoft.com/office/drawing/2014/main" id="{72EA6E8A-0554-3340-8089-7AB31A8826BB}"/>
+                  </a:ext>
+                </a:extLst>
+              </p:cNvPr>
+              <p:cNvSpPr/>
+              <p:nvPr/>
+            </p:nvSpPr>
+            <p:spPr>
+              <a:xfrm>
+                <a:off x="967495" y="441175"/>
+                <a:ext cx="1132625" cy="326101"/>
+              </a:xfrm>
+              <a:prstGeom prst="roundRect">
+                <a:avLst>
+                  <a:gd name="adj" fmla="val 41146"/>
+                </a:avLst>
+              </a:prstGeom>
               <a:solidFill>
                 <a:schemeClr val="tx1"/>
               </a:solidFill>
-            </a:ln>
-          </p:spPr>
-          <p:style>
-            <a:lnRef idx="2">
-              <a:schemeClr val="accent1">
-                <a:shade val="50000"/>
-              </a:schemeClr>
-            </a:lnRef>
-            <a:fillRef idx="1">
-              <a:schemeClr val="accent1"/>
-            </a:fillRef>
-            <a:effectRef idx="0">
-              <a:schemeClr val="accent1"/>
-            </a:effectRef>
-            <a:fontRef idx="minor">
-              <a:schemeClr val="lt1"/>
-            </a:fontRef>
-          </p:style>
-          <p:txBody>
-            <a:bodyPr rtlCol="0" anchor="ctr"/>
-            <a:lstStyle/>
-            <a:p>
-              <a:pPr algn="ctr"/>
-              <a:endParaRPr lang="en-US"/>
-            </a:p>
-          </p:txBody>
-        </p:sp>
-        <p:sp>
-          <p:nvSpPr>
-            <p:cNvPr id="57" name="Rounded Rectangle 56">
-              <a:extLst>
-                <a:ext uri="{FF2B5EF4-FFF2-40B4-BE49-F238E27FC236}">
-                  <a16:creationId xmlns:a16="http://schemas.microsoft.com/office/drawing/2014/main" id="{72EA6E8A-0554-3340-8089-7AB31A8826BB}"/>
-                </a:ext>
-              </a:extLst>
-            </p:cNvPr>
-            <p:cNvSpPr/>
-            <p:nvPr/>
-          </p:nvSpPr>
-          <p:spPr>
-            <a:xfrm>
-              <a:off x="967495" y="441175"/>
-              <a:ext cx="1132625" cy="326101"/>
-            </a:xfrm>
-            <a:prstGeom prst="roundRect">
-              <a:avLst>
-                <a:gd name="adj" fmla="val 41146"/>
-              </a:avLst>
-            </a:prstGeom>
-            <a:solidFill>
-              <a:schemeClr val="tx1"/>
-            </a:solidFill>
-            <a:ln>
+              <a:ln>
+                <a:solidFill>
+                  <a:schemeClr val="tx1"/>
+                </a:solidFill>
+              </a:ln>
+            </p:spPr>
+            <p:style>
+              <a:lnRef idx="2">
+                <a:schemeClr val="accent1">
+                  <a:shade val="50000"/>
+                </a:schemeClr>
+              </a:lnRef>
+              <a:fillRef idx="1">
+                <a:schemeClr val="accent1"/>
+              </a:fillRef>
+              <a:effectRef idx="0">
+                <a:schemeClr val="accent1"/>
+              </a:effectRef>
+              <a:fontRef idx="minor">
+                <a:schemeClr val="lt1"/>
+              </a:fontRef>
+            </p:style>
+            <p:txBody>
+              <a:bodyPr rtlCol="0" anchor="ctr"/>
+              <a:lstStyle/>
+              <a:p>
+                <a:pPr algn="ctr"/>
+                <a:endParaRPr lang="en-US"/>
+              </a:p>
+            </p:txBody>
+          </p:sp>
+          <p:sp>
+            <p:nvSpPr>
+              <p:cNvPr id="58" name="Rounded Rectangle 57">
+                <a:extLst>
+                  <a:ext uri="{FF2B5EF4-FFF2-40B4-BE49-F238E27FC236}">
+                    <a16:creationId xmlns:a16="http://schemas.microsoft.com/office/drawing/2014/main" id="{669C7B2E-BD6B-A94D-A395-A834B8C85D8B}"/>
+                  </a:ext>
+                </a:extLst>
+              </p:cNvPr>
+              <p:cNvSpPr/>
+              <p:nvPr/>
+            </p:nvSpPr>
+            <p:spPr>
+              <a:xfrm>
+                <a:off x="967495" y="431974"/>
+                <a:ext cx="1132625" cy="172251"/>
+              </a:xfrm>
+              <a:prstGeom prst="roundRect">
+                <a:avLst>
+                  <a:gd name="adj" fmla="val 0"/>
+                </a:avLst>
+              </a:prstGeom>
               <a:solidFill>
                 <a:schemeClr val="tx1"/>
               </a:solidFill>
-            </a:ln>
-          </p:spPr>
-          <p:style>
-            <a:lnRef idx="2">
-              <a:schemeClr val="accent1">
-                <a:shade val="50000"/>
-              </a:schemeClr>
-            </a:lnRef>
-            <a:fillRef idx="1">
-              <a:schemeClr val="accent1"/>
-            </a:fillRef>
-            <a:effectRef idx="0">
-              <a:schemeClr val="accent1"/>
-            </a:effectRef>
-            <a:fontRef idx="minor">
-              <a:schemeClr val="lt1"/>
-            </a:fontRef>
-          </p:style>
-          <p:txBody>
-            <a:bodyPr rtlCol="0" anchor="ctr"/>
-            <a:lstStyle/>
-            <a:p>
-              <a:pPr algn="ctr"/>
-              <a:endParaRPr lang="en-US"/>
-            </a:p>
-          </p:txBody>
-        </p:sp>
-        <p:sp>
-          <p:nvSpPr>
-            <p:cNvPr id="58" name="Rounded Rectangle 57">
-              <a:extLst>
-                <a:ext uri="{FF2B5EF4-FFF2-40B4-BE49-F238E27FC236}">
-                  <a16:creationId xmlns:a16="http://schemas.microsoft.com/office/drawing/2014/main" id="{669C7B2E-BD6B-A94D-A395-A834B8C85D8B}"/>
-                </a:ext>
-              </a:extLst>
-            </p:cNvPr>
-            <p:cNvSpPr/>
-            <p:nvPr/>
-          </p:nvSpPr>
-          <p:spPr>
-            <a:xfrm>
-              <a:off x="967495" y="431974"/>
-              <a:ext cx="1132625" cy="172251"/>
-            </a:xfrm>
-            <a:prstGeom prst="roundRect">
-              <a:avLst>
-                <a:gd name="adj" fmla="val 0"/>
-              </a:avLst>
-            </a:prstGeom>
-            <a:solidFill>
-              <a:schemeClr val="tx1"/>
-            </a:solidFill>
-            <a:ln>
+              <a:ln>
+                <a:solidFill>
+                  <a:schemeClr val="tx1"/>
+                </a:solidFill>
+              </a:ln>
+            </p:spPr>
+            <p:style>
+              <a:lnRef idx="2">
+                <a:schemeClr val="accent1">
+                  <a:shade val="50000"/>
+                </a:schemeClr>
+              </a:lnRef>
+              <a:fillRef idx="1">
+                <a:schemeClr val="accent1"/>
+              </a:fillRef>
+              <a:effectRef idx="0">
+                <a:schemeClr val="accent1"/>
+              </a:effectRef>
+              <a:fontRef idx="minor">
+                <a:schemeClr val="lt1"/>
+              </a:fontRef>
+            </p:style>
+            <p:txBody>
+              <a:bodyPr rtlCol="0" anchor="ctr"/>
+              <a:lstStyle/>
+              <a:p>
+                <a:pPr algn="ctr"/>
+                <a:endParaRPr lang="en-US"/>
+              </a:p>
+            </p:txBody>
+          </p:sp>
+          <p:sp>
+            <p:nvSpPr>
+              <p:cNvPr id="59" name="TextBox 58">
+                <a:extLst>
+                  <a:ext uri="{FF2B5EF4-FFF2-40B4-BE49-F238E27FC236}">
+                    <a16:creationId xmlns:a16="http://schemas.microsoft.com/office/drawing/2014/main" id="{C2032456-4996-4046-8685-B1B907D2BF46}"/>
+                  </a:ext>
+                </a:extLst>
+              </p:cNvPr>
+              <p:cNvSpPr txBox="1"/>
+              <p:nvPr/>
+            </p:nvSpPr>
+            <p:spPr>
+              <a:xfrm>
+                <a:off x="292122" y="1490782"/>
+                <a:ext cx="2463800" cy="1384995"/>
+              </a:xfrm>
+              <a:prstGeom prst="rect">
+                <a:avLst/>
+              </a:prstGeom>
+              <a:noFill/>
+            </p:spPr>
+            <p:txBody>
+              <a:bodyPr wrap="square" rtlCol="0">
+                <a:spAutoFit/>
+              </a:bodyPr>
+              <a:lstStyle/>
+              <a:p>
+                <a:r>
+                  <a:rPr lang="en-US" sz="2800" dirty="0">
+                    <a:latin typeface="Times" pitchFamily="2" charset="0"/>
+                  </a:rPr>
+                  <a:t>rest. 1:         yes</a:t>
+                </a:r>
+              </a:p>
+              <a:p>
+                <a:r>
+                  <a:rPr lang="en-US" sz="2800" dirty="0">
+                    <a:latin typeface="Times" pitchFamily="2" charset="0"/>
+                  </a:rPr>
+                  <a:t>rest. 2:         yes</a:t>
+                </a:r>
+              </a:p>
+              <a:p>
+                <a:r>
+                  <a:rPr lang="en-US" sz="2800" dirty="0">
+                    <a:latin typeface="Times" pitchFamily="2" charset="0"/>
+                  </a:rPr>
+                  <a:t>rest. 3:         yes</a:t>
+                </a:r>
+              </a:p>
+            </p:txBody>
+          </p:sp>
+          <p:sp>
+            <p:nvSpPr>
+              <p:cNvPr id="60" name="Rounded Rectangle 59">
+                <a:extLst>
+                  <a:ext uri="{FF2B5EF4-FFF2-40B4-BE49-F238E27FC236}">
+                    <a16:creationId xmlns:a16="http://schemas.microsoft.com/office/drawing/2014/main" id="{F46B62BA-973C-D34F-A6B8-22E9A53FBCD7}"/>
+                  </a:ext>
+                </a:extLst>
+              </p:cNvPr>
+              <p:cNvSpPr/>
+              <p:nvPr/>
+            </p:nvSpPr>
+            <p:spPr>
+              <a:xfrm>
+                <a:off x="61787" y="1364087"/>
+                <a:ext cx="119627" cy="326101"/>
+              </a:xfrm>
+              <a:prstGeom prst="roundRect">
+                <a:avLst>
+                  <a:gd name="adj" fmla="val 41146"/>
+                </a:avLst>
+              </a:prstGeom>
               <a:solidFill>
                 <a:schemeClr val="tx1"/>
               </a:solidFill>
-            </a:ln>
-          </p:spPr>
-          <p:style>
-            <a:lnRef idx="2">
-              <a:schemeClr val="accent1">
-                <a:shade val="50000"/>
-              </a:schemeClr>
-            </a:lnRef>
-            <a:fillRef idx="1">
-              <a:schemeClr val="accent1"/>
-            </a:fillRef>
-            <a:effectRef idx="0">
-              <a:schemeClr val="accent1"/>
-            </a:effectRef>
-            <a:fontRef idx="minor">
-              <a:schemeClr val="lt1"/>
-            </a:fontRef>
-          </p:style>
-          <p:txBody>
-            <a:bodyPr rtlCol="0" anchor="ctr"/>
-            <a:lstStyle/>
-            <a:p>
-              <a:pPr algn="ctr"/>
-              <a:endParaRPr lang="en-US"/>
-            </a:p>
-          </p:txBody>
-        </p:sp>
-        <p:sp>
-          <p:nvSpPr>
-            <p:cNvPr id="59" name="TextBox 58">
-              <a:extLst>
-                <a:ext uri="{FF2B5EF4-FFF2-40B4-BE49-F238E27FC236}">
-                  <a16:creationId xmlns:a16="http://schemas.microsoft.com/office/drawing/2014/main" id="{C2032456-4996-4046-8685-B1B907D2BF46}"/>
-                </a:ext>
-              </a:extLst>
-            </p:cNvPr>
-            <p:cNvSpPr txBox="1"/>
-            <p:nvPr/>
-          </p:nvSpPr>
-          <p:spPr>
-            <a:xfrm>
-              <a:off x="292122" y="1490782"/>
-              <a:ext cx="2463800" cy="1384995"/>
+              <a:ln>
+                <a:solidFill>
+                  <a:schemeClr val="tx1"/>
+                </a:solidFill>
+              </a:ln>
+            </p:spPr>
+            <p:style>
+              <a:lnRef idx="2">
+                <a:schemeClr val="accent1">
+                  <a:shade val="50000"/>
+                </a:schemeClr>
+              </a:lnRef>
+              <a:fillRef idx="1">
+                <a:schemeClr val="accent1"/>
+              </a:fillRef>
+              <a:effectRef idx="0">
+                <a:schemeClr val="accent1"/>
+              </a:effectRef>
+              <a:fontRef idx="minor">
+                <a:schemeClr val="lt1"/>
+              </a:fontRef>
+            </p:style>
+            <p:txBody>
+              <a:bodyPr rtlCol="0" anchor="ctr"/>
+              <a:lstStyle/>
+              <a:p>
+                <a:pPr algn="ctr"/>
+                <a:endParaRPr lang="en-US"/>
+              </a:p>
+            </p:txBody>
+          </p:sp>
+          <p:sp>
+            <p:nvSpPr>
+              <p:cNvPr id="61" name="Rounded Rectangle 60">
+                <a:extLst>
+                  <a:ext uri="{FF2B5EF4-FFF2-40B4-BE49-F238E27FC236}">
+                    <a16:creationId xmlns:a16="http://schemas.microsoft.com/office/drawing/2014/main" id="{66506474-BC39-5745-8B17-740163209D33}"/>
+                  </a:ext>
+                </a:extLst>
+              </p:cNvPr>
+              <p:cNvSpPr/>
+              <p:nvPr/>
+            </p:nvSpPr>
+            <p:spPr>
+              <a:xfrm>
+                <a:off x="2886202" y="1333751"/>
+                <a:ext cx="119627" cy="326101"/>
+              </a:xfrm>
+              <a:prstGeom prst="roundRect">
+                <a:avLst>
+                  <a:gd name="adj" fmla="val 41146"/>
+                </a:avLst>
+              </a:prstGeom>
+              <a:solidFill>
+                <a:schemeClr val="tx1"/>
+              </a:solidFill>
+              <a:ln>
+                <a:solidFill>
+                  <a:schemeClr val="tx1"/>
+                </a:solidFill>
+              </a:ln>
+            </p:spPr>
+            <p:style>
+              <a:lnRef idx="2">
+                <a:schemeClr val="accent1">
+                  <a:shade val="50000"/>
+                </a:schemeClr>
+              </a:lnRef>
+              <a:fillRef idx="1">
+                <a:schemeClr val="accent1"/>
+              </a:fillRef>
+              <a:effectRef idx="0">
+                <a:schemeClr val="accent1"/>
+              </a:effectRef>
+              <a:fontRef idx="minor">
+                <a:schemeClr val="lt1"/>
+              </a:fontRef>
+            </p:style>
+            <p:txBody>
+              <a:bodyPr rtlCol="0" anchor="ctr"/>
+              <a:lstStyle/>
+              <a:p>
+                <a:pPr algn="ctr"/>
+                <a:endParaRPr lang="en-US"/>
+              </a:p>
+            </p:txBody>
+          </p:sp>
+          <p:sp>
+            <p:nvSpPr>
+              <p:cNvPr id="62" name="Rounded Rectangle 61">
+                <a:extLst>
+                  <a:ext uri="{FF2B5EF4-FFF2-40B4-BE49-F238E27FC236}">
+                    <a16:creationId xmlns:a16="http://schemas.microsoft.com/office/drawing/2014/main" id="{06AFB65C-E761-244A-95B9-663DFA9C9945}"/>
+                  </a:ext>
+                </a:extLst>
+              </p:cNvPr>
+              <p:cNvSpPr/>
+              <p:nvPr/>
+            </p:nvSpPr>
+            <p:spPr>
+              <a:xfrm>
+                <a:off x="2886202" y="1742570"/>
+                <a:ext cx="119627" cy="326101"/>
+              </a:xfrm>
+              <a:prstGeom prst="roundRect">
+                <a:avLst>
+                  <a:gd name="adj" fmla="val 41146"/>
+                </a:avLst>
+              </a:prstGeom>
+              <a:solidFill>
+                <a:schemeClr val="tx1"/>
+              </a:solidFill>
+              <a:ln>
+                <a:solidFill>
+                  <a:schemeClr val="tx1"/>
+                </a:solidFill>
+              </a:ln>
+            </p:spPr>
+            <p:style>
+              <a:lnRef idx="2">
+                <a:schemeClr val="accent1">
+                  <a:shade val="50000"/>
+                </a:schemeClr>
+              </a:lnRef>
+              <a:fillRef idx="1">
+                <a:schemeClr val="accent1"/>
+              </a:fillRef>
+              <a:effectRef idx="0">
+                <a:schemeClr val="accent1"/>
+              </a:effectRef>
+              <a:fontRef idx="minor">
+                <a:schemeClr val="lt1"/>
+              </a:fontRef>
+            </p:style>
+            <p:txBody>
+              <a:bodyPr rtlCol="0" anchor="ctr"/>
+              <a:lstStyle/>
+              <a:p>
+                <a:pPr algn="ctr"/>
+                <a:endParaRPr lang="en-US"/>
+              </a:p>
+            </p:txBody>
+          </p:sp>
+          <p:sp>
+            <p:nvSpPr>
+              <p:cNvPr id="63" name="Rounded Rectangle 62">
+                <a:extLst>
+                  <a:ext uri="{FF2B5EF4-FFF2-40B4-BE49-F238E27FC236}">
+                    <a16:creationId xmlns:a16="http://schemas.microsoft.com/office/drawing/2014/main" id="{F6049251-D510-4044-B16E-39FD927CB343}"/>
+                  </a:ext>
+                </a:extLst>
+              </p:cNvPr>
+              <p:cNvSpPr/>
+              <p:nvPr/>
+            </p:nvSpPr>
+            <p:spPr>
+              <a:xfrm>
+                <a:off x="335417" y="971905"/>
+                <a:ext cx="2396779" cy="279975"/>
+              </a:xfrm>
+              <a:prstGeom prst="roundRect">
+                <a:avLst>
+                  <a:gd name="adj" fmla="val 50000"/>
+                </a:avLst>
+              </a:prstGeom>
+              <a:solidFill>
+                <a:schemeClr val="tx2">
+                  <a:lumMod val="20000"/>
+                  <a:lumOff val="80000"/>
+                </a:schemeClr>
+              </a:solidFill>
+              <a:ln>
+                <a:solidFill>
+                  <a:schemeClr val="tx1"/>
+                </a:solidFill>
+              </a:ln>
+            </p:spPr>
+            <p:style>
+              <a:lnRef idx="2">
+                <a:schemeClr val="accent1">
+                  <a:shade val="50000"/>
+                </a:schemeClr>
+              </a:lnRef>
+              <a:fillRef idx="1">
+                <a:schemeClr val="accent1"/>
+              </a:fillRef>
+              <a:effectRef idx="0">
+                <a:schemeClr val="accent1"/>
+              </a:effectRef>
+              <a:fontRef idx="minor">
+                <a:schemeClr val="lt1"/>
+              </a:fontRef>
+            </p:style>
+            <p:txBody>
+              <a:bodyPr rtlCol="0" anchor="ctr"/>
+              <a:lstStyle/>
+              <a:p>
+                <a:pPr algn="ctr"/>
+                <a:endParaRPr lang="en-US"/>
+              </a:p>
+            </p:txBody>
+          </p:sp>
+        </p:grpSp>
+        <p:sp>
+          <p:nvSpPr>
+            <p:cNvPr id="76" name="Rectangle 75">
+              <a:extLst>
+                <a:ext uri="{FF2B5EF4-FFF2-40B4-BE49-F238E27FC236}">
+                  <a16:creationId xmlns:a16="http://schemas.microsoft.com/office/drawing/2014/main" id="{6218B3E0-14D4-BE40-AB92-FB2A78A4566E}"/>
+                </a:ext>
+              </a:extLst>
+            </p:cNvPr>
+            <p:cNvSpPr/>
+            <p:nvPr/>
+          </p:nvSpPr>
+          <p:spPr>
+            <a:xfrm>
+              <a:off x="4487863" y="463775"/>
+              <a:ext cx="2944042" cy="5693108"/>
             </a:xfrm>
             <a:prstGeom prst="rect">
               <a:avLst/>
             </a:prstGeom>
             <a:noFill/>
-          </p:spPr>
-          <p:txBody>
-            <a:bodyPr wrap="square" rtlCol="0">
-              <a:spAutoFit/>
-            </a:bodyPr>
-            <a:lstStyle/>
-            <a:p>
-              <a:r>
-                <a:rPr lang="en-US" sz="2800" dirty="0">
-                  <a:latin typeface="Times" pitchFamily="2" charset="0"/>
-                </a:rPr>
-                <a:t>rest. 1:         yes</a:t>
-              </a:r>
-            </a:p>
-            <a:p>
-              <a:r>
-                <a:rPr lang="en-US" sz="2800" dirty="0">
-                  <a:latin typeface="Times" pitchFamily="2" charset="0"/>
-                </a:rPr>
-                <a:t>rest. 2:         yes</a:t>
-              </a:r>
-            </a:p>
-            <a:p>
-              <a:r>
-                <a:rPr lang="en-US" sz="2800" dirty="0">
-                  <a:latin typeface="Times" pitchFamily="2" charset="0"/>
-                </a:rPr>
-                <a:t>rest. 3:         yes</a:t>
-              </a:r>
-            </a:p>
-          </p:txBody>
-        </p:sp>
-        <p:sp>
-          <p:nvSpPr>
-            <p:cNvPr id="60" name="Rounded Rectangle 59">
-              <a:extLst>
-                <a:ext uri="{FF2B5EF4-FFF2-40B4-BE49-F238E27FC236}">
-                  <a16:creationId xmlns:a16="http://schemas.microsoft.com/office/drawing/2014/main" id="{F46B62BA-973C-D34F-A6B8-22E9A53FBCD7}"/>
-                </a:ext>
-              </a:extLst>
-            </p:cNvPr>
-            <p:cNvSpPr/>
-            <p:nvPr/>
-          </p:nvSpPr>
-          <p:spPr>
-            <a:xfrm>
-              <a:off x="61787" y="1364087"/>
-              <a:ext cx="119627" cy="326101"/>
-            </a:xfrm>
-            <a:prstGeom prst="roundRect">
-              <a:avLst>
-                <a:gd name="adj" fmla="val 41146"/>
-              </a:avLst>
-            </a:prstGeom>
-            <a:solidFill>
-              <a:schemeClr val="tx1"/>
-            </a:solidFill>
-            <a:ln>
-              <a:solidFill>
-                <a:schemeClr val="tx1"/>
-              </a:solidFill>
-            </a:ln>
-          </p:spPr>
-          <p:style>
-            <a:lnRef idx="2">
-              <a:schemeClr val="accent1">
-                <a:shade val="50000"/>
-              </a:schemeClr>
-            </a:lnRef>
-            <a:fillRef idx="1">
-              <a:schemeClr val="accent1"/>
-            </a:fillRef>
-            <a:effectRef idx="0">
-              <a:schemeClr val="accent1"/>
-            </a:effectRef>
-            <a:fontRef idx="minor">
-              <a:schemeClr val="lt1"/>
-            </a:fontRef>
-          </p:style>
-          <p:txBody>
-            <a:bodyPr rtlCol="0" anchor="ctr"/>
-            <a:lstStyle/>
-            <a:p>
-              <a:pPr algn="ctr"/>
-              <a:endParaRPr lang="en-US"/>
-            </a:p>
-          </p:txBody>
-        </p:sp>
-        <p:sp>
-          <p:nvSpPr>
-            <p:cNvPr id="61" name="Rounded Rectangle 60">
-              <a:extLst>
-                <a:ext uri="{FF2B5EF4-FFF2-40B4-BE49-F238E27FC236}">
-                  <a16:creationId xmlns:a16="http://schemas.microsoft.com/office/drawing/2014/main" id="{66506474-BC39-5745-8B17-740163209D33}"/>
-                </a:ext>
-              </a:extLst>
-            </p:cNvPr>
-            <p:cNvSpPr/>
-            <p:nvPr/>
-          </p:nvSpPr>
-          <p:spPr>
-            <a:xfrm>
-              <a:off x="2886202" y="1333751"/>
-              <a:ext cx="119627" cy="326101"/>
-            </a:xfrm>
-            <a:prstGeom prst="roundRect">
-              <a:avLst>
-                <a:gd name="adj" fmla="val 41146"/>
-              </a:avLst>
-            </a:prstGeom>
-            <a:solidFill>
-              <a:schemeClr val="tx1"/>
-            </a:solidFill>
-            <a:ln>
-              <a:solidFill>
-                <a:schemeClr val="tx1"/>
-              </a:solidFill>
-            </a:ln>
-          </p:spPr>
-          <p:style>
-            <a:lnRef idx="2">
-              <a:schemeClr val="accent1">
-                <a:shade val="50000"/>
-              </a:schemeClr>
-            </a:lnRef>
-            <a:fillRef idx="1">
-              <a:schemeClr val="accent1"/>
-            </a:fillRef>
-            <a:effectRef idx="0">
-              <a:schemeClr val="accent1"/>
-            </a:effectRef>
-            <a:fontRef idx="minor">
-              <a:schemeClr val="lt1"/>
-            </a:fontRef>
-          </p:style>
-          <p:txBody>
-            <a:bodyPr rtlCol="0" anchor="ctr"/>
-            <a:lstStyle/>
-            <a:p>
-              <a:pPr algn="ctr"/>
-              <a:endParaRPr lang="en-US"/>
-            </a:p>
-          </p:txBody>
-        </p:sp>
-        <p:sp>
-          <p:nvSpPr>
-            <p:cNvPr id="62" name="Rounded Rectangle 61">
-              <a:extLst>
-                <a:ext uri="{FF2B5EF4-FFF2-40B4-BE49-F238E27FC236}">
-                  <a16:creationId xmlns:a16="http://schemas.microsoft.com/office/drawing/2014/main" id="{06AFB65C-E761-244A-95B9-663DFA9C9945}"/>
-                </a:ext>
-              </a:extLst>
-            </p:cNvPr>
-            <p:cNvSpPr/>
-            <p:nvPr/>
-          </p:nvSpPr>
-          <p:spPr>
-            <a:xfrm>
-              <a:off x="2886202" y="1742570"/>
-              <a:ext cx="119627" cy="326101"/>
-            </a:xfrm>
-            <a:prstGeom prst="roundRect">
-              <a:avLst>
-                <a:gd name="adj" fmla="val 41146"/>
-              </a:avLst>
-            </a:prstGeom>
-            <a:solidFill>
-              <a:schemeClr val="tx1"/>
-            </a:solidFill>
-            <a:ln>
-              <a:solidFill>
-                <a:schemeClr val="tx1"/>
-              </a:solidFill>
-            </a:ln>
-          </p:spPr>
-          <p:style>
-            <a:lnRef idx="2">
-              <a:schemeClr val="accent1">
-                <a:shade val="50000"/>
-              </a:schemeClr>
-            </a:lnRef>
-            <a:fillRef idx="1">
-              <a:schemeClr val="accent1"/>
-            </a:fillRef>
-            <a:effectRef idx="0">
-              <a:schemeClr val="accent1"/>
-            </a:effectRef>
-            <a:fontRef idx="minor">
-              <a:schemeClr val="lt1"/>
-            </a:fontRef>
-          </p:style>
-          <p:txBody>
-            <a:bodyPr rtlCol="0" anchor="ctr"/>
-            <a:lstStyle/>
-            <a:p>
-              <a:pPr algn="ctr"/>
-              <a:endParaRPr lang="en-US"/>
-            </a:p>
-          </p:txBody>
-        </p:sp>
-        <p:sp>
-          <p:nvSpPr>
-            <p:cNvPr id="63" name="Rounded Rectangle 62">
-              <a:extLst>
-                <a:ext uri="{FF2B5EF4-FFF2-40B4-BE49-F238E27FC236}">
-                  <a16:creationId xmlns:a16="http://schemas.microsoft.com/office/drawing/2014/main" id="{F6049251-D510-4044-B16E-39FD927CB343}"/>
-                </a:ext>
-              </a:extLst>
-            </p:cNvPr>
-            <p:cNvSpPr/>
-            <p:nvPr/>
-          </p:nvSpPr>
-          <p:spPr>
-            <a:xfrm>
-              <a:off x="335417" y="971905"/>
-              <a:ext cx="2396779" cy="279975"/>
-            </a:xfrm>
-            <a:prstGeom prst="roundRect">
-              <a:avLst>
-                <a:gd name="adj" fmla="val 50000"/>
-              </a:avLst>
-            </a:prstGeom>
-            <a:solidFill>
-              <a:schemeClr val="tx2">
-                <a:lumMod val="20000"/>
-                <a:lumOff val="80000"/>
-              </a:schemeClr>
-            </a:solidFill>
-            <a:ln>
-              <a:solidFill>
-                <a:schemeClr val="tx1"/>
+            <a:ln w="28575">
+              <a:solidFill>
+                <a:srgbClr val="C00000"/>
               </a:solidFill>
             </a:ln>
           </p:spPr>
@@ -10454,10 +10600,10 @@
       </p:grpSp>
       <p:grpSp>
         <p:nvGrpSpPr>
-          <p:cNvPr id="64" name="Group 63">
+          <p:cNvPr id="8" name="Group 7">
             <a:extLst>
               <a:ext uri="{FF2B5EF4-FFF2-40B4-BE49-F238E27FC236}">
-                <a16:creationId xmlns:a16="http://schemas.microsoft.com/office/drawing/2014/main" id="{BE707E40-0FA9-8449-A6FE-A0C484C3C8BA}"/>
+                <a16:creationId xmlns:a16="http://schemas.microsoft.com/office/drawing/2014/main" id="{9745BA31-D03C-2549-B4A8-2EA79B7FE3E7}"/>
               </a:ext>
             </a:extLst>
           </p:cNvPr>
@@ -10466,39 +10612,558 @@
         </p:nvGrpSpPr>
         <p:grpSpPr>
           <a:xfrm>
-            <a:off x="8265287" y="436557"/>
-            <a:ext cx="2944042" cy="5693107"/>
-            <a:chOff x="61787" y="404755"/>
-            <a:chExt cx="2944042" cy="5693107"/>
+            <a:off x="8265285" y="436556"/>
+            <a:ext cx="2944044" cy="5693108"/>
+            <a:chOff x="8265285" y="436556"/>
+            <a:chExt cx="2944044" cy="5693108"/>
           </a:xfrm>
         </p:grpSpPr>
-        <p:sp>
-          <p:nvSpPr>
-            <p:cNvPr id="65" name="Rounded Rectangle 64">
-              <a:extLst>
-                <a:ext uri="{FF2B5EF4-FFF2-40B4-BE49-F238E27FC236}">
-                  <a16:creationId xmlns:a16="http://schemas.microsoft.com/office/drawing/2014/main" id="{3F541610-F259-0346-BF81-563BC17B8F7A}"/>
-                </a:ext>
-              </a:extLst>
-            </p:cNvPr>
-            <p:cNvSpPr/>
-            <p:nvPr/>
-          </p:nvSpPr>
-          <p:spPr>
-            <a:xfrm>
-              <a:off x="96608" y="404755"/>
-              <a:ext cx="2875265" cy="5693107"/>
-            </a:xfrm>
-            <a:prstGeom prst="roundRect">
-              <a:avLst/>
-            </a:prstGeom>
-            <a:solidFill>
-              <a:schemeClr val="tx1"/>
-            </a:solidFill>
-            <a:ln>
+        <p:grpSp>
+          <p:nvGrpSpPr>
+            <p:cNvPr id="64" name="Group 63">
+              <a:extLst>
+                <a:ext uri="{FF2B5EF4-FFF2-40B4-BE49-F238E27FC236}">
+                  <a16:creationId xmlns:a16="http://schemas.microsoft.com/office/drawing/2014/main" id="{BE707E40-0FA9-8449-A6FE-A0C484C3C8BA}"/>
+                </a:ext>
+              </a:extLst>
+            </p:cNvPr>
+            <p:cNvGrpSpPr/>
+            <p:nvPr/>
+          </p:nvGrpSpPr>
+          <p:grpSpPr>
+            <a:xfrm>
+              <a:off x="8265287" y="436557"/>
+              <a:ext cx="2944042" cy="5693107"/>
+              <a:chOff x="61787" y="404755"/>
+              <a:chExt cx="2944042" cy="5693107"/>
+            </a:xfrm>
+          </p:grpSpPr>
+          <p:sp>
+            <p:nvSpPr>
+              <p:cNvPr id="65" name="Rounded Rectangle 64">
+                <a:extLst>
+                  <a:ext uri="{FF2B5EF4-FFF2-40B4-BE49-F238E27FC236}">
+                    <a16:creationId xmlns:a16="http://schemas.microsoft.com/office/drawing/2014/main" id="{3F541610-F259-0346-BF81-563BC17B8F7A}"/>
+                  </a:ext>
+                </a:extLst>
+              </p:cNvPr>
+              <p:cNvSpPr/>
+              <p:nvPr/>
+            </p:nvSpPr>
+            <p:spPr>
+              <a:xfrm>
+                <a:off x="96608" y="404755"/>
+                <a:ext cx="2875265" cy="5693107"/>
+              </a:xfrm>
+              <a:prstGeom prst="roundRect">
+                <a:avLst/>
+              </a:prstGeom>
               <a:solidFill>
                 <a:schemeClr val="tx1"/>
               </a:solidFill>
+              <a:ln>
+                <a:solidFill>
+                  <a:schemeClr val="tx1"/>
+                </a:solidFill>
+              </a:ln>
+            </p:spPr>
+            <p:style>
+              <a:lnRef idx="2">
+                <a:schemeClr val="accent1">
+                  <a:shade val="50000"/>
+                </a:schemeClr>
+              </a:lnRef>
+              <a:fillRef idx="1">
+                <a:schemeClr val="accent1"/>
+              </a:fillRef>
+              <a:effectRef idx="0">
+                <a:schemeClr val="accent1"/>
+              </a:effectRef>
+              <a:fontRef idx="minor">
+                <a:schemeClr val="lt1"/>
+              </a:fontRef>
+            </p:style>
+            <p:txBody>
+              <a:bodyPr rtlCol="0" anchor="ctr"/>
+              <a:lstStyle/>
+              <a:p>
+                <a:pPr algn="ctr"/>
+                <a:endParaRPr lang="en-US"/>
+              </a:p>
+            </p:txBody>
+          </p:sp>
+          <p:sp>
+            <p:nvSpPr>
+              <p:cNvPr id="66" name="Rounded Rectangle 65">
+                <a:extLst>
+                  <a:ext uri="{FF2B5EF4-FFF2-40B4-BE49-F238E27FC236}">
+                    <a16:creationId xmlns:a16="http://schemas.microsoft.com/office/drawing/2014/main" id="{9EF62082-CDF6-E041-8AB0-CF59EE3E0E4D}"/>
+                  </a:ext>
+                </a:extLst>
+              </p:cNvPr>
+              <p:cNvSpPr/>
+              <p:nvPr/>
+            </p:nvSpPr>
+            <p:spPr>
+              <a:xfrm>
+                <a:off x="192561" y="498764"/>
+                <a:ext cx="2682494" cy="5510463"/>
+              </a:xfrm>
+              <a:prstGeom prst="roundRect">
+                <a:avLst/>
+              </a:prstGeom>
+              <a:solidFill>
+                <a:schemeClr val="bg1"/>
+              </a:solidFill>
+              <a:ln>
+                <a:solidFill>
+                  <a:schemeClr val="tx1"/>
+                </a:solidFill>
+              </a:ln>
+            </p:spPr>
+            <p:style>
+              <a:lnRef idx="2">
+                <a:schemeClr val="accent1">
+                  <a:shade val="50000"/>
+                </a:schemeClr>
+              </a:lnRef>
+              <a:fillRef idx="1">
+                <a:schemeClr val="accent1"/>
+              </a:fillRef>
+              <a:effectRef idx="0">
+                <a:schemeClr val="accent1"/>
+              </a:effectRef>
+              <a:fontRef idx="minor">
+                <a:schemeClr val="lt1"/>
+              </a:fontRef>
+            </p:style>
+            <p:txBody>
+              <a:bodyPr rtlCol="0" anchor="ctr"/>
+              <a:lstStyle/>
+              <a:p>
+                <a:pPr algn="ctr"/>
+                <a:endParaRPr lang="en-US"/>
+              </a:p>
+            </p:txBody>
+          </p:sp>
+          <p:sp>
+            <p:nvSpPr>
+              <p:cNvPr id="67" name="Rounded Rectangle 66">
+                <a:extLst>
+                  <a:ext uri="{FF2B5EF4-FFF2-40B4-BE49-F238E27FC236}">
+                    <a16:creationId xmlns:a16="http://schemas.microsoft.com/office/drawing/2014/main" id="{D96A24D7-696A-E241-BC10-488952F50F8A}"/>
+                  </a:ext>
+                </a:extLst>
+              </p:cNvPr>
+              <p:cNvSpPr/>
+              <p:nvPr/>
+            </p:nvSpPr>
+            <p:spPr>
+              <a:xfrm>
+                <a:off x="967495" y="441175"/>
+                <a:ext cx="1132625" cy="326101"/>
+              </a:xfrm>
+              <a:prstGeom prst="roundRect">
+                <a:avLst>
+                  <a:gd name="adj" fmla="val 41146"/>
+                </a:avLst>
+              </a:prstGeom>
+              <a:solidFill>
+                <a:schemeClr val="tx1"/>
+              </a:solidFill>
+              <a:ln>
+                <a:solidFill>
+                  <a:schemeClr val="tx1"/>
+                </a:solidFill>
+              </a:ln>
+            </p:spPr>
+            <p:style>
+              <a:lnRef idx="2">
+                <a:schemeClr val="accent1">
+                  <a:shade val="50000"/>
+                </a:schemeClr>
+              </a:lnRef>
+              <a:fillRef idx="1">
+                <a:schemeClr val="accent1"/>
+              </a:fillRef>
+              <a:effectRef idx="0">
+                <a:schemeClr val="accent1"/>
+              </a:effectRef>
+              <a:fontRef idx="minor">
+                <a:schemeClr val="lt1"/>
+              </a:fontRef>
+            </p:style>
+            <p:txBody>
+              <a:bodyPr rtlCol="0" anchor="ctr"/>
+              <a:lstStyle/>
+              <a:p>
+                <a:pPr algn="ctr"/>
+                <a:endParaRPr lang="en-US"/>
+              </a:p>
+            </p:txBody>
+          </p:sp>
+          <p:sp>
+            <p:nvSpPr>
+              <p:cNvPr id="68" name="Rounded Rectangle 67">
+                <a:extLst>
+                  <a:ext uri="{FF2B5EF4-FFF2-40B4-BE49-F238E27FC236}">
+                    <a16:creationId xmlns:a16="http://schemas.microsoft.com/office/drawing/2014/main" id="{FCA60496-1D8C-524E-B055-65E2AE08217B}"/>
+                  </a:ext>
+                </a:extLst>
+              </p:cNvPr>
+              <p:cNvSpPr/>
+              <p:nvPr/>
+            </p:nvSpPr>
+            <p:spPr>
+              <a:xfrm>
+                <a:off x="967495" y="431974"/>
+                <a:ext cx="1132625" cy="172251"/>
+              </a:xfrm>
+              <a:prstGeom prst="roundRect">
+                <a:avLst>
+                  <a:gd name="adj" fmla="val 0"/>
+                </a:avLst>
+              </a:prstGeom>
+              <a:solidFill>
+                <a:schemeClr val="tx1"/>
+              </a:solidFill>
+              <a:ln>
+                <a:solidFill>
+                  <a:schemeClr val="tx1"/>
+                </a:solidFill>
+              </a:ln>
+            </p:spPr>
+            <p:style>
+              <a:lnRef idx="2">
+                <a:schemeClr val="accent1">
+                  <a:shade val="50000"/>
+                </a:schemeClr>
+              </a:lnRef>
+              <a:fillRef idx="1">
+                <a:schemeClr val="accent1"/>
+              </a:fillRef>
+              <a:effectRef idx="0">
+                <a:schemeClr val="accent1"/>
+              </a:effectRef>
+              <a:fontRef idx="minor">
+                <a:schemeClr val="lt1"/>
+              </a:fontRef>
+            </p:style>
+            <p:txBody>
+              <a:bodyPr rtlCol="0" anchor="ctr"/>
+              <a:lstStyle/>
+              <a:p>
+                <a:pPr algn="ctr"/>
+                <a:endParaRPr lang="en-US"/>
+              </a:p>
+            </p:txBody>
+          </p:sp>
+          <p:sp>
+            <p:nvSpPr>
+              <p:cNvPr id="69" name="TextBox 68">
+                <a:extLst>
+                  <a:ext uri="{FF2B5EF4-FFF2-40B4-BE49-F238E27FC236}">
+                    <a16:creationId xmlns:a16="http://schemas.microsoft.com/office/drawing/2014/main" id="{4DF77F5D-0203-A84F-A691-8F429F37B306}"/>
+                  </a:ext>
+                </a:extLst>
+              </p:cNvPr>
+              <p:cNvSpPr txBox="1"/>
+              <p:nvPr/>
+            </p:nvSpPr>
+            <p:spPr>
+              <a:xfrm>
+                <a:off x="292122" y="1490782"/>
+                <a:ext cx="2463800" cy="1384995"/>
+              </a:xfrm>
+              <a:prstGeom prst="rect">
+                <a:avLst/>
+              </a:prstGeom>
+              <a:noFill/>
+            </p:spPr>
+            <p:txBody>
+              <a:bodyPr wrap="square" rtlCol="0">
+                <a:spAutoFit/>
+              </a:bodyPr>
+              <a:lstStyle/>
+              <a:p>
+                <a:r>
+                  <a:rPr lang="en-US" sz="2800" dirty="0">
+                    <a:latin typeface="Times" pitchFamily="2" charset="0"/>
+                  </a:rPr>
+                  <a:t>rest. 1:          no</a:t>
+                </a:r>
+              </a:p>
+              <a:p>
+                <a:r>
+                  <a:rPr lang="en-US" sz="2800" dirty="0">
+                    <a:latin typeface="Times" pitchFamily="2" charset="0"/>
+                  </a:rPr>
+                  <a:t>rest. 2:          no</a:t>
+                </a:r>
+              </a:p>
+              <a:p>
+                <a:r>
+                  <a:rPr lang="en-US" sz="2800" dirty="0">
+                    <a:latin typeface="Times" pitchFamily="2" charset="0"/>
+                  </a:rPr>
+                  <a:t>rest. 3:          no</a:t>
+                </a:r>
+              </a:p>
+            </p:txBody>
+          </p:sp>
+          <p:sp>
+            <p:nvSpPr>
+              <p:cNvPr id="70" name="Rounded Rectangle 69">
+                <a:extLst>
+                  <a:ext uri="{FF2B5EF4-FFF2-40B4-BE49-F238E27FC236}">
+                    <a16:creationId xmlns:a16="http://schemas.microsoft.com/office/drawing/2014/main" id="{4BF4940A-C9D6-F542-B699-2B0F056A72E2}"/>
+                  </a:ext>
+                </a:extLst>
+              </p:cNvPr>
+              <p:cNvSpPr/>
+              <p:nvPr/>
+            </p:nvSpPr>
+            <p:spPr>
+              <a:xfrm>
+                <a:off x="61787" y="1364087"/>
+                <a:ext cx="119627" cy="326101"/>
+              </a:xfrm>
+              <a:prstGeom prst="roundRect">
+                <a:avLst>
+                  <a:gd name="adj" fmla="val 41146"/>
+                </a:avLst>
+              </a:prstGeom>
+              <a:solidFill>
+                <a:schemeClr val="tx1"/>
+              </a:solidFill>
+              <a:ln>
+                <a:solidFill>
+                  <a:schemeClr val="tx1"/>
+                </a:solidFill>
+              </a:ln>
+            </p:spPr>
+            <p:style>
+              <a:lnRef idx="2">
+                <a:schemeClr val="accent1">
+                  <a:shade val="50000"/>
+                </a:schemeClr>
+              </a:lnRef>
+              <a:fillRef idx="1">
+                <a:schemeClr val="accent1"/>
+              </a:fillRef>
+              <a:effectRef idx="0">
+                <a:schemeClr val="accent1"/>
+              </a:effectRef>
+              <a:fontRef idx="minor">
+                <a:schemeClr val="lt1"/>
+              </a:fontRef>
+            </p:style>
+            <p:txBody>
+              <a:bodyPr rtlCol="0" anchor="ctr"/>
+              <a:lstStyle/>
+              <a:p>
+                <a:pPr algn="ctr"/>
+                <a:endParaRPr lang="en-US"/>
+              </a:p>
+            </p:txBody>
+          </p:sp>
+          <p:sp>
+            <p:nvSpPr>
+              <p:cNvPr id="71" name="Rounded Rectangle 70">
+                <a:extLst>
+                  <a:ext uri="{FF2B5EF4-FFF2-40B4-BE49-F238E27FC236}">
+                    <a16:creationId xmlns:a16="http://schemas.microsoft.com/office/drawing/2014/main" id="{E71AD13A-FA73-FD4A-A58D-B31158949583}"/>
+                  </a:ext>
+                </a:extLst>
+              </p:cNvPr>
+              <p:cNvSpPr/>
+              <p:nvPr/>
+            </p:nvSpPr>
+            <p:spPr>
+              <a:xfrm>
+                <a:off x="2886202" y="1333751"/>
+                <a:ext cx="119627" cy="326101"/>
+              </a:xfrm>
+              <a:prstGeom prst="roundRect">
+                <a:avLst>
+                  <a:gd name="adj" fmla="val 41146"/>
+                </a:avLst>
+              </a:prstGeom>
+              <a:solidFill>
+                <a:schemeClr val="tx1"/>
+              </a:solidFill>
+              <a:ln>
+                <a:solidFill>
+                  <a:schemeClr val="tx1"/>
+                </a:solidFill>
+              </a:ln>
+            </p:spPr>
+            <p:style>
+              <a:lnRef idx="2">
+                <a:schemeClr val="accent1">
+                  <a:shade val="50000"/>
+                </a:schemeClr>
+              </a:lnRef>
+              <a:fillRef idx="1">
+                <a:schemeClr val="accent1"/>
+              </a:fillRef>
+              <a:effectRef idx="0">
+                <a:schemeClr val="accent1"/>
+              </a:effectRef>
+              <a:fontRef idx="minor">
+                <a:schemeClr val="lt1"/>
+              </a:fontRef>
+            </p:style>
+            <p:txBody>
+              <a:bodyPr rtlCol="0" anchor="ctr"/>
+              <a:lstStyle/>
+              <a:p>
+                <a:pPr algn="ctr"/>
+                <a:endParaRPr lang="en-US"/>
+              </a:p>
+            </p:txBody>
+          </p:sp>
+          <p:sp>
+            <p:nvSpPr>
+              <p:cNvPr id="72" name="Rounded Rectangle 71">
+                <a:extLst>
+                  <a:ext uri="{FF2B5EF4-FFF2-40B4-BE49-F238E27FC236}">
+                    <a16:creationId xmlns:a16="http://schemas.microsoft.com/office/drawing/2014/main" id="{46DA8EDB-3D0B-154B-AD53-F411017E1A46}"/>
+                  </a:ext>
+                </a:extLst>
+              </p:cNvPr>
+              <p:cNvSpPr/>
+              <p:nvPr/>
+            </p:nvSpPr>
+            <p:spPr>
+              <a:xfrm>
+                <a:off x="2886202" y="1742570"/>
+                <a:ext cx="119627" cy="326101"/>
+              </a:xfrm>
+              <a:prstGeom prst="roundRect">
+                <a:avLst>
+                  <a:gd name="adj" fmla="val 41146"/>
+                </a:avLst>
+              </a:prstGeom>
+              <a:solidFill>
+                <a:schemeClr val="tx1"/>
+              </a:solidFill>
+              <a:ln>
+                <a:solidFill>
+                  <a:schemeClr val="tx1"/>
+                </a:solidFill>
+              </a:ln>
+            </p:spPr>
+            <p:style>
+              <a:lnRef idx="2">
+                <a:schemeClr val="accent1">
+                  <a:shade val="50000"/>
+                </a:schemeClr>
+              </a:lnRef>
+              <a:fillRef idx="1">
+                <a:schemeClr val="accent1"/>
+              </a:fillRef>
+              <a:effectRef idx="0">
+                <a:schemeClr val="accent1"/>
+              </a:effectRef>
+              <a:fontRef idx="minor">
+                <a:schemeClr val="lt1"/>
+              </a:fontRef>
+            </p:style>
+            <p:txBody>
+              <a:bodyPr rtlCol="0" anchor="ctr"/>
+              <a:lstStyle/>
+              <a:p>
+                <a:pPr algn="ctr"/>
+                <a:endParaRPr lang="en-US"/>
+              </a:p>
+            </p:txBody>
+          </p:sp>
+          <p:sp>
+            <p:nvSpPr>
+              <p:cNvPr id="73" name="Rounded Rectangle 72">
+                <a:extLst>
+                  <a:ext uri="{FF2B5EF4-FFF2-40B4-BE49-F238E27FC236}">
+                    <a16:creationId xmlns:a16="http://schemas.microsoft.com/office/drawing/2014/main" id="{9943351D-A035-A347-A5EA-AE2579C7E8C0}"/>
+                  </a:ext>
+                </a:extLst>
+              </p:cNvPr>
+              <p:cNvSpPr/>
+              <p:nvPr/>
+            </p:nvSpPr>
+            <p:spPr>
+              <a:xfrm>
+                <a:off x="335417" y="971905"/>
+                <a:ext cx="2396779" cy="279975"/>
+              </a:xfrm>
+              <a:prstGeom prst="roundRect">
+                <a:avLst>
+                  <a:gd name="adj" fmla="val 50000"/>
+                </a:avLst>
+              </a:prstGeom>
+              <a:solidFill>
+                <a:schemeClr val="tx2">
+                  <a:lumMod val="20000"/>
+                  <a:lumOff val="80000"/>
+                </a:schemeClr>
+              </a:solidFill>
+              <a:ln>
+                <a:solidFill>
+                  <a:schemeClr val="tx1"/>
+                </a:solidFill>
+              </a:ln>
+            </p:spPr>
+            <p:style>
+              <a:lnRef idx="2">
+                <a:schemeClr val="accent1">
+                  <a:shade val="50000"/>
+                </a:schemeClr>
+              </a:lnRef>
+              <a:fillRef idx="1">
+                <a:schemeClr val="accent1"/>
+              </a:fillRef>
+              <a:effectRef idx="0">
+                <a:schemeClr val="accent1"/>
+              </a:effectRef>
+              <a:fontRef idx="minor">
+                <a:schemeClr val="lt1"/>
+              </a:fontRef>
+            </p:style>
+            <p:txBody>
+              <a:bodyPr rtlCol="0" anchor="ctr"/>
+              <a:lstStyle/>
+              <a:p>
+                <a:pPr algn="ctr"/>
+                <a:endParaRPr lang="en-US"/>
+              </a:p>
+            </p:txBody>
+          </p:sp>
+        </p:grpSp>
+        <p:sp>
+          <p:nvSpPr>
+            <p:cNvPr id="77" name="Rectangle 76">
+              <a:extLst>
+                <a:ext uri="{FF2B5EF4-FFF2-40B4-BE49-F238E27FC236}">
+                  <a16:creationId xmlns:a16="http://schemas.microsoft.com/office/drawing/2014/main" id="{288F0292-4EFB-F74C-8EE3-99BAFF516CDD}"/>
+                </a:ext>
+              </a:extLst>
+            </p:cNvPr>
+            <p:cNvSpPr/>
+            <p:nvPr/>
+          </p:nvSpPr>
+          <p:spPr>
+            <a:xfrm>
+              <a:off x="8265285" y="436556"/>
+              <a:ext cx="2944042" cy="5693108"/>
+            </a:xfrm>
+            <a:prstGeom prst="rect">
+              <a:avLst/>
+            </a:prstGeom>
+            <a:noFill/>
+            <a:ln w="28575">
+              <a:solidFill>
+                <a:srgbClr val="C00000"/>
+              </a:solidFill>
             </a:ln>
           </p:spPr>
           <p:style>
@@ -10526,609 +11191,7 @@
             </a:p>
           </p:txBody>
         </p:sp>
-        <p:sp>
-          <p:nvSpPr>
-            <p:cNvPr id="66" name="Rounded Rectangle 65">
-              <a:extLst>
-                <a:ext uri="{FF2B5EF4-FFF2-40B4-BE49-F238E27FC236}">
-                  <a16:creationId xmlns:a16="http://schemas.microsoft.com/office/drawing/2014/main" id="{9EF62082-CDF6-E041-8AB0-CF59EE3E0E4D}"/>
-                </a:ext>
-              </a:extLst>
-            </p:cNvPr>
-            <p:cNvSpPr/>
-            <p:nvPr/>
-          </p:nvSpPr>
-          <p:spPr>
-            <a:xfrm>
-              <a:off x="192561" y="498764"/>
-              <a:ext cx="2682494" cy="5510463"/>
-            </a:xfrm>
-            <a:prstGeom prst="roundRect">
-              <a:avLst/>
-            </a:prstGeom>
-            <a:solidFill>
-              <a:schemeClr val="bg1"/>
-            </a:solidFill>
-            <a:ln>
-              <a:solidFill>
-                <a:schemeClr val="tx1"/>
-              </a:solidFill>
-            </a:ln>
-          </p:spPr>
-          <p:style>
-            <a:lnRef idx="2">
-              <a:schemeClr val="accent1">
-                <a:shade val="50000"/>
-              </a:schemeClr>
-            </a:lnRef>
-            <a:fillRef idx="1">
-              <a:schemeClr val="accent1"/>
-            </a:fillRef>
-            <a:effectRef idx="0">
-              <a:schemeClr val="accent1"/>
-            </a:effectRef>
-            <a:fontRef idx="minor">
-              <a:schemeClr val="lt1"/>
-            </a:fontRef>
-          </p:style>
-          <p:txBody>
-            <a:bodyPr rtlCol="0" anchor="ctr"/>
-            <a:lstStyle/>
-            <a:p>
-              <a:pPr algn="ctr"/>
-              <a:endParaRPr lang="en-US"/>
-            </a:p>
-          </p:txBody>
-        </p:sp>
-        <p:sp>
-          <p:nvSpPr>
-            <p:cNvPr id="67" name="Rounded Rectangle 66">
-              <a:extLst>
-                <a:ext uri="{FF2B5EF4-FFF2-40B4-BE49-F238E27FC236}">
-                  <a16:creationId xmlns:a16="http://schemas.microsoft.com/office/drawing/2014/main" id="{D96A24D7-696A-E241-BC10-488952F50F8A}"/>
-                </a:ext>
-              </a:extLst>
-            </p:cNvPr>
-            <p:cNvSpPr/>
-            <p:nvPr/>
-          </p:nvSpPr>
-          <p:spPr>
-            <a:xfrm>
-              <a:off x="967495" y="441175"/>
-              <a:ext cx="1132625" cy="326101"/>
-            </a:xfrm>
-            <a:prstGeom prst="roundRect">
-              <a:avLst>
-                <a:gd name="adj" fmla="val 41146"/>
-              </a:avLst>
-            </a:prstGeom>
-            <a:solidFill>
-              <a:schemeClr val="tx1"/>
-            </a:solidFill>
-            <a:ln>
-              <a:solidFill>
-                <a:schemeClr val="tx1"/>
-              </a:solidFill>
-            </a:ln>
-          </p:spPr>
-          <p:style>
-            <a:lnRef idx="2">
-              <a:schemeClr val="accent1">
-                <a:shade val="50000"/>
-              </a:schemeClr>
-            </a:lnRef>
-            <a:fillRef idx="1">
-              <a:schemeClr val="accent1"/>
-            </a:fillRef>
-            <a:effectRef idx="0">
-              <a:schemeClr val="accent1"/>
-            </a:effectRef>
-            <a:fontRef idx="minor">
-              <a:schemeClr val="lt1"/>
-            </a:fontRef>
-          </p:style>
-          <p:txBody>
-            <a:bodyPr rtlCol="0" anchor="ctr"/>
-            <a:lstStyle/>
-            <a:p>
-              <a:pPr algn="ctr"/>
-              <a:endParaRPr lang="en-US"/>
-            </a:p>
-          </p:txBody>
-        </p:sp>
-        <p:sp>
-          <p:nvSpPr>
-            <p:cNvPr id="68" name="Rounded Rectangle 67">
-              <a:extLst>
-                <a:ext uri="{FF2B5EF4-FFF2-40B4-BE49-F238E27FC236}">
-                  <a16:creationId xmlns:a16="http://schemas.microsoft.com/office/drawing/2014/main" id="{FCA60496-1D8C-524E-B055-65E2AE08217B}"/>
-                </a:ext>
-              </a:extLst>
-            </p:cNvPr>
-            <p:cNvSpPr/>
-            <p:nvPr/>
-          </p:nvSpPr>
-          <p:spPr>
-            <a:xfrm>
-              <a:off x="967495" y="431974"/>
-              <a:ext cx="1132625" cy="172251"/>
-            </a:xfrm>
-            <a:prstGeom prst="roundRect">
-              <a:avLst>
-                <a:gd name="adj" fmla="val 0"/>
-              </a:avLst>
-            </a:prstGeom>
-            <a:solidFill>
-              <a:schemeClr val="tx1"/>
-            </a:solidFill>
-            <a:ln>
-              <a:solidFill>
-                <a:schemeClr val="tx1"/>
-              </a:solidFill>
-            </a:ln>
-          </p:spPr>
-          <p:style>
-            <a:lnRef idx="2">
-              <a:schemeClr val="accent1">
-                <a:shade val="50000"/>
-              </a:schemeClr>
-            </a:lnRef>
-            <a:fillRef idx="1">
-              <a:schemeClr val="accent1"/>
-            </a:fillRef>
-            <a:effectRef idx="0">
-              <a:schemeClr val="accent1"/>
-            </a:effectRef>
-            <a:fontRef idx="minor">
-              <a:schemeClr val="lt1"/>
-            </a:fontRef>
-          </p:style>
-          <p:txBody>
-            <a:bodyPr rtlCol="0" anchor="ctr"/>
-            <a:lstStyle/>
-            <a:p>
-              <a:pPr algn="ctr"/>
-              <a:endParaRPr lang="en-US"/>
-            </a:p>
-          </p:txBody>
-        </p:sp>
-        <p:sp>
-          <p:nvSpPr>
-            <p:cNvPr id="69" name="TextBox 68">
-              <a:extLst>
-                <a:ext uri="{FF2B5EF4-FFF2-40B4-BE49-F238E27FC236}">
-                  <a16:creationId xmlns:a16="http://schemas.microsoft.com/office/drawing/2014/main" id="{4DF77F5D-0203-A84F-A691-8F429F37B306}"/>
-                </a:ext>
-              </a:extLst>
-            </p:cNvPr>
-            <p:cNvSpPr txBox="1"/>
-            <p:nvPr/>
-          </p:nvSpPr>
-          <p:spPr>
-            <a:xfrm>
-              <a:off x="292122" y="1490782"/>
-              <a:ext cx="2463800" cy="1384995"/>
-            </a:xfrm>
-            <a:prstGeom prst="rect">
-              <a:avLst/>
-            </a:prstGeom>
-            <a:noFill/>
-          </p:spPr>
-          <p:txBody>
-            <a:bodyPr wrap="square" rtlCol="0">
-              <a:spAutoFit/>
-            </a:bodyPr>
-            <a:lstStyle/>
-            <a:p>
-              <a:r>
-                <a:rPr lang="en-US" sz="2800" dirty="0">
-                  <a:latin typeface="Times" pitchFamily="2" charset="0"/>
-                </a:rPr>
-                <a:t>rest. 1:          no</a:t>
-              </a:r>
-            </a:p>
-            <a:p>
-              <a:r>
-                <a:rPr lang="en-US" sz="2800" dirty="0">
-                  <a:latin typeface="Times" pitchFamily="2" charset="0"/>
-                </a:rPr>
-                <a:t>rest. 2:          no</a:t>
-              </a:r>
-            </a:p>
-            <a:p>
-              <a:r>
-                <a:rPr lang="en-US" sz="2800" dirty="0">
-                  <a:latin typeface="Times" pitchFamily="2" charset="0"/>
-                </a:rPr>
-                <a:t>rest. 3:          no</a:t>
-              </a:r>
-            </a:p>
-          </p:txBody>
-        </p:sp>
-        <p:sp>
-          <p:nvSpPr>
-            <p:cNvPr id="70" name="Rounded Rectangle 69">
-              <a:extLst>
-                <a:ext uri="{FF2B5EF4-FFF2-40B4-BE49-F238E27FC236}">
-                  <a16:creationId xmlns:a16="http://schemas.microsoft.com/office/drawing/2014/main" id="{4BF4940A-C9D6-F542-B699-2B0F056A72E2}"/>
-                </a:ext>
-              </a:extLst>
-            </p:cNvPr>
-            <p:cNvSpPr/>
-            <p:nvPr/>
-          </p:nvSpPr>
-          <p:spPr>
-            <a:xfrm>
-              <a:off x="61787" y="1364087"/>
-              <a:ext cx="119627" cy="326101"/>
-            </a:xfrm>
-            <a:prstGeom prst="roundRect">
-              <a:avLst>
-                <a:gd name="adj" fmla="val 41146"/>
-              </a:avLst>
-            </a:prstGeom>
-            <a:solidFill>
-              <a:schemeClr val="tx1"/>
-            </a:solidFill>
-            <a:ln>
-              <a:solidFill>
-                <a:schemeClr val="tx1"/>
-              </a:solidFill>
-            </a:ln>
-          </p:spPr>
-          <p:style>
-            <a:lnRef idx="2">
-              <a:schemeClr val="accent1">
-                <a:shade val="50000"/>
-              </a:schemeClr>
-            </a:lnRef>
-            <a:fillRef idx="1">
-              <a:schemeClr val="accent1"/>
-            </a:fillRef>
-            <a:effectRef idx="0">
-              <a:schemeClr val="accent1"/>
-            </a:effectRef>
-            <a:fontRef idx="minor">
-              <a:schemeClr val="lt1"/>
-            </a:fontRef>
-          </p:style>
-          <p:txBody>
-            <a:bodyPr rtlCol="0" anchor="ctr"/>
-            <a:lstStyle/>
-            <a:p>
-              <a:pPr algn="ctr"/>
-              <a:endParaRPr lang="en-US"/>
-            </a:p>
-          </p:txBody>
-        </p:sp>
-        <p:sp>
-          <p:nvSpPr>
-            <p:cNvPr id="71" name="Rounded Rectangle 70">
-              <a:extLst>
-                <a:ext uri="{FF2B5EF4-FFF2-40B4-BE49-F238E27FC236}">
-                  <a16:creationId xmlns:a16="http://schemas.microsoft.com/office/drawing/2014/main" id="{E71AD13A-FA73-FD4A-A58D-B31158949583}"/>
-                </a:ext>
-              </a:extLst>
-            </p:cNvPr>
-            <p:cNvSpPr/>
-            <p:nvPr/>
-          </p:nvSpPr>
-          <p:spPr>
-            <a:xfrm>
-              <a:off x="2886202" y="1333751"/>
-              <a:ext cx="119627" cy="326101"/>
-            </a:xfrm>
-            <a:prstGeom prst="roundRect">
-              <a:avLst>
-                <a:gd name="adj" fmla="val 41146"/>
-              </a:avLst>
-            </a:prstGeom>
-            <a:solidFill>
-              <a:schemeClr val="tx1"/>
-            </a:solidFill>
-            <a:ln>
-              <a:solidFill>
-                <a:schemeClr val="tx1"/>
-              </a:solidFill>
-            </a:ln>
-          </p:spPr>
-          <p:style>
-            <a:lnRef idx="2">
-              <a:schemeClr val="accent1">
-                <a:shade val="50000"/>
-              </a:schemeClr>
-            </a:lnRef>
-            <a:fillRef idx="1">
-              <a:schemeClr val="accent1"/>
-            </a:fillRef>
-            <a:effectRef idx="0">
-              <a:schemeClr val="accent1"/>
-            </a:effectRef>
-            <a:fontRef idx="minor">
-              <a:schemeClr val="lt1"/>
-            </a:fontRef>
-          </p:style>
-          <p:txBody>
-            <a:bodyPr rtlCol="0" anchor="ctr"/>
-            <a:lstStyle/>
-            <a:p>
-              <a:pPr algn="ctr"/>
-              <a:endParaRPr lang="en-US"/>
-            </a:p>
-          </p:txBody>
-        </p:sp>
-        <p:sp>
-          <p:nvSpPr>
-            <p:cNvPr id="72" name="Rounded Rectangle 71">
-              <a:extLst>
-                <a:ext uri="{FF2B5EF4-FFF2-40B4-BE49-F238E27FC236}">
-                  <a16:creationId xmlns:a16="http://schemas.microsoft.com/office/drawing/2014/main" id="{46DA8EDB-3D0B-154B-AD53-F411017E1A46}"/>
-                </a:ext>
-              </a:extLst>
-            </p:cNvPr>
-            <p:cNvSpPr/>
-            <p:nvPr/>
-          </p:nvSpPr>
-          <p:spPr>
-            <a:xfrm>
-              <a:off x="2886202" y="1742570"/>
-              <a:ext cx="119627" cy="326101"/>
-            </a:xfrm>
-            <a:prstGeom prst="roundRect">
-              <a:avLst>
-                <a:gd name="adj" fmla="val 41146"/>
-              </a:avLst>
-            </a:prstGeom>
-            <a:solidFill>
-              <a:schemeClr val="tx1"/>
-            </a:solidFill>
-            <a:ln>
-              <a:solidFill>
-                <a:schemeClr val="tx1"/>
-              </a:solidFill>
-            </a:ln>
-          </p:spPr>
-          <p:style>
-            <a:lnRef idx="2">
-              <a:schemeClr val="accent1">
-                <a:shade val="50000"/>
-              </a:schemeClr>
-            </a:lnRef>
-            <a:fillRef idx="1">
-              <a:schemeClr val="accent1"/>
-            </a:fillRef>
-            <a:effectRef idx="0">
-              <a:schemeClr val="accent1"/>
-            </a:effectRef>
-            <a:fontRef idx="minor">
-              <a:schemeClr val="lt1"/>
-            </a:fontRef>
-          </p:style>
-          <p:txBody>
-            <a:bodyPr rtlCol="0" anchor="ctr"/>
-            <a:lstStyle/>
-            <a:p>
-              <a:pPr algn="ctr"/>
-              <a:endParaRPr lang="en-US"/>
-            </a:p>
-          </p:txBody>
-        </p:sp>
-        <p:sp>
-          <p:nvSpPr>
-            <p:cNvPr id="73" name="Rounded Rectangle 72">
-              <a:extLst>
-                <a:ext uri="{FF2B5EF4-FFF2-40B4-BE49-F238E27FC236}">
-                  <a16:creationId xmlns:a16="http://schemas.microsoft.com/office/drawing/2014/main" id="{9943351D-A035-A347-A5EA-AE2579C7E8C0}"/>
-                </a:ext>
-              </a:extLst>
-            </p:cNvPr>
-            <p:cNvSpPr/>
-            <p:nvPr/>
-          </p:nvSpPr>
-          <p:spPr>
-            <a:xfrm>
-              <a:off x="335417" y="971905"/>
-              <a:ext cx="2396779" cy="279975"/>
-            </a:xfrm>
-            <a:prstGeom prst="roundRect">
-              <a:avLst>
-                <a:gd name="adj" fmla="val 50000"/>
-              </a:avLst>
-            </a:prstGeom>
-            <a:solidFill>
-              <a:schemeClr val="tx2">
-                <a:lumMod val="20000"/>
-                <a:lumOff val="80000"/>
-              </a:schemeClr>
-            </a:solidFill>
-            <a:ln>
-              <a:solidFill>
-                <a:schemeClr val="tx1"/>
-              </a:solidFill>
-            </a:ln>
-          </p:spPr>
-          <p:style>
-            <a:lnRef idx="2">
-              <a:schemeClr val="accent1">
-                <a:shade val="50000"/>
-              </a:schemeClr>
-            </a:lnRef>
-            <a:fillRef idx="1">
-              <a:schemeClr val="accent1"/>
-            </a:fillRef>
-            <a:effectRef idx="0">
-              <a:schemeClr val="accent1"/>
-            </a:effectRef>
-            <a:fontRef idx="minor">
-              <a:schemeClr val="lt1"/>
-            </a:fontRef>
-          </p:style>
-          <p:txBody>
-            <a:bodyPr rtlCol="0" anchor="ctr"/>
-            <a:lstStyle/>
-            <a:p>
-              <a:pPr algn="ctr"/>
-              <a:endParaRPr lang="en-US"/>
-            </a:p>
-          </p:txBody>
-        </p:sp>
       </p:grpSp>
-      <p:sp>
-        <p:nvSpPr>
-          <p:cNvPr id="5" name="Rectangle 4">
-            <a:extLst>
-              <a:ext uri="{FF2B5EF4-FFF2-40B4-BE49-F238E27FC236}">
-                <a16:creationId xmlns:a16="http://schemas.microsoft.com/office/drawing/2014/main" id="{D8F5E2B0-7502-0B44-8469-DA20A4BA4E71}"/>
-              </a:ext>
-            </a:extLst>
-          </p:cNvPr>
-          <p:cNvSpPr/>
-          <p:nvPr/>
-        </p:nvSpPr>
-        <p:spPr>
-          <a:xfrm>
-            <a:off x="896112" y="436556"/>
-            <a:ext cx="2944042" cy="5693108"/>
-          </a:xfrm>
-          <a:prstGeom prst="rect">
-            <a:avLst/>
-          </a:prstGeom>
-          <a:noFill/>
-          <a:ln w="28575">
-            <a:solidFill>
-              <a:srgbClr val="C00000"/>
-            </a:solidFill>
-          </a:ln>
-        </p:spPr>
-        <p:style>
-          <a:lnRef idx="2">
-            <a:schemeClr val="accent1">
-              <a:shade val="50000"/>
-            </a:schemeClr>
-          </a:lnRef>
-          <a:fillRef idx="1">
-            <a:schemeClr val="accent1"/>
-          </a:fillRef>
-          <a:effectRef idx="0">
-            <a:schemeClr val="accent1"/>
-          </a:effectRef>
-          <a:fontRef idx="minor">
-            <a:schemeClr val="lt1"/>
-          </a:fontRef>
-        </p:style>
-        <p:txBody>
-          <a:bodyPr rtlCol="0" anchor="ctr"/>
-          <a:lstStyle/>
-          <a:p>
-            <a:pPr algn="ctr"/>
-            <a:endParaRPr lang="en-US"/>
-          </a:p>
-        </p:txBody>
-      </p:sp>
-      <p:sp>
-        <p:nvSpPr>
-          <p:cNvPr id="76" name="Rectangle 75">
-            <a:extLst>
-              <a:ext uri="{FF2B5EF4-FFF2-40B4-BE49-F238E27FC236}">
-                <a16:creationId xmlns:a16="http://schemas.microsoft.com/office/drawing/2014/main" id="{6218B3E0-14D4-BE40-AB92-FB2A78A4566E}"/>
-              </a:ext>
-            </a:extLst>
-          </p:cNvPr>
-          <p:cNvSpPr/>
-          <p:nvPr/>
-        </p:nvSpPr>
-        <p:spPr>
-          <a:xfrm>
-            <a:off x="4487863" y="463775"/>
-            <a:ext cx="2944042" cy="5693108"/>
-          </a:xfrm>
-          <a:prstGeom prst="rect">
-            <a:avLst/>
-          </a:prstGeom>
-          <a:noFill/>
-          <a:ln w="28575">
-            <a:solidFill>
-              <a:srgbClr val="C00000"/>
-            </a:solidFill>
-          </a:ln>
-        </p:spPr>
-        <p:style>
-          <a:lnRef idx="2">
-            <a:schemeClr val="accent1">
-              <a:shade val="50000"/>
-            </a:schemeClr>
-          </a:lnRef>
-          <a:fillRef idx="1">
-            <a:schemeClr val="accent1"/>
-          </a:fillRef>
-          <a:effectRef idx="0">
-            <a:schemeClr val="accent1"/>
-          </a:effectRef>
-          <a:fontRef idx="minor">
-            <a:schemeClr val="lt1"/>
-          </a:fontRef>
-        </p:style>
-        <p:txBody>
-          <a:bodyPr rtlCol="0" anchor="ctr"/>
-          <a:lstStyle/>
-          <a:p>
-            <a:pPr algn="ctr"/>
-            <a:endParaRPr lang="en-US"/>
-          </a:p>
-        </p:txBody>
-      </p:sp>
-      <p:sp>
-        <p:nvSpPr>
-          <p:cNvPr id="77" name="Rectangle 76">
-            <a:extLst>
-              <a:ext uri="{FF2B5EF4-FFF2-40B4-BE49-F238E27FC236}">
-                <a16:creationId xmlns:a16="http://schemas.microsoft.com/office/drawing/2014/main" id="{288F0292-4EFB-F74C-8EE3-99BAFF516CDD}"/>
-              </a:ext>
-            </a:extLst>
-          </p:cNvPr>
-          <p:cNvSpPr/>
-          <p:nvPr/>
-        </p:nvSpPr>
-        <p:spPr>
-          <a:xfrm>
-            <a:off x="8265285" y="436556"/>
-            <a:ext cx="2944042" cy="5693108"/>
-          </a:xfrm>
-          <a:prstGeom prst="rect">
-            <a:avLst/>
-          </a:prstGeom>
-          <a:noFill/>
-          <a:ln w="28575">
-            <a:solidFill>
-              <a:srgbClr val="C00000"/>
-            </a:solidFill>
-          </a:ln>
-        </p:spPr>
-        <p:style>
-          <a:lnRef idx="2">
-            <a:schemeClr val="accent1">
-              <a:shade val="50000"/>
-            </a:schemeClr>
-          </a:lnRef>
-          <a:fillRef idx="1">
-            <a:schemeClr val="accent1"/>
-          </a:fillRef>
-          <a:effectRef idx="0">
-            <a:schemeClr val="accent1"/>
-          </a:effectRef>
-          <a:fontRef idx="minor">
-            <a:schemeClr val="lt1"/>
-          </a:fontRef>
-        </p:style>
-        <p:txBody>
-          <a:bodyPr rtlCol="0" anchor="ctr"/>
-          <a:lstStyle/>
-          <a:p>
-            <a:pPr algn="ctr"/>
-            <a:endParaRPr lang="en-US"/>
-          </a:p>
-        </p:txBody>
-      </p:sp>
     </p:spTree>
     <p:extLst>
       <p:ext uri="{BB962C8B-B14F-4D97-AF65-F5344CB8AC3E}">
@@ -12038,10 +12101,10 @@
       </p:grpSp>
       <p:grpSp>
         <p:nvGrpSpPr>
-          <p:cNvPr id="19" name="Group 18">
+          <p:cNvPr id="6" name="Group 5">
             <a:extLst>
               <a:ext uri="{FF2B5EF4-FFF2-40B4-BE49-F238E27FC236}">
-                <a16:creationId xmlns:a16="http://schemas.microsoft.com/office/drawing/2014/main" id="{445539D6-8BFB-AF4F-B639-A1B1DEAD5660}"/>
+                <a16:creationId xmlns:a16="http://schemas.microsoft.com/office/drawing/2014/main" id="{006CBC07-5C6E-D34E-8498-42ABB713A573}"/>
               </a:ext>
             </a:extLst>
           </p:cNvPr>
@@ -12051,38 +12114,725 @@
         <p:grpSpPr>
           <a:xfrm>
             <a:off x="7606929" y="246965"/>
-            <a:ext cx="2944042" cy="5693107"/>
-            <a:chOff x="3345314" y="246966"/>
-            <a:chExt cx="2944042" cy="5693107"/>
+            <a:ext cx="2944042" cy="5693108"/>
+            <a:chOff x="7606929" y="246965"/>
+            <a:chExt cx="2944042" cy="5693108"/>
           </a:xfrm>
         </p:grpSpPr>
-        <p:sp>
-          <p:nvSpPr>
-            <p:cNvPr id="20" name="Rounded Rectangle 19">
-              <a:extLst>
-                <a:ext uri="{FF2B5EF4-FFF2-40B4-BE49-F238E27FC236}">
-                  <a16:creationId xmlns:a16="http://schemas.microsoft.com/office/drawing/2014/main" id="{9DADD19B-875E-F74D-B6E7-DDEE62ED51BE}"/>
-                </a:ext>
-              </a:extLst>
-            </p:cNvPr>
-            <p:cNvSpPr/>
-            <p:nvPr/>
-          </p:nvSpPr>
-          <p:spPr>
-            <a:xfrm>
-              <a:off x="3380135" y="246966"/>
-              <a:ext cx="2875265" cy="5693107"/>
-            </a:xfrm>
-            <a:prstGeom prst="roundRect">
-              <a:avLst/>
-            </a:prstGeom>
-            <a:solidFill>
-              <a:schemeClr val="tx1"/>
-            </a:solidFill>
-            <a:ln>
+        <p:grpSp>
+          <p:nvGrpSpPr>
+            <p:cNvPr id="19" name="Group 18">
+              <a:extLst>
+                <a:ext uri="{FF2B5EF4-FFF2-40B4-BE49-F238E27FC236}">
+                  <a16:creationId xmlns:a16="http://schemas.microsoft.com/office/drawing/2014/main" id="{445539D6-8BFB-AF4F-B639-A1B1DEAD5660}"/>
+                </a:ext>
+              </a:extLst>
+            </p:cNvPr>
+            <p:cNvGrpSpPr/>
+            <p:nvPr/>
+          </p:nvGrpSpPr>
+          <p:grpSpPr>
+            <a:xfrm>
+              <a:off x="7606929" y="246965"/>
+              <a:ext cx="2944042" cy="5693107"/>
+              <a:chOff x="3345314" y="246966"/>
+              <a:chExt cx="2944042" cy="5693107"/>
+            </a:xfrm>
+          </p:grpSpPr>
+          <p:sp>
+            <p:nvSpPr>
+              <p:cNvPr id="20" name="Rounded Rectangle 19">
+                <a:extLst>
+                  <a:ext uri="{FF2B5EF4-FFF2-40B4-BE49-F238E27FC236}">
+                    <a16:creationId xmlns:a16="http://schemas.microsoft.com/office/drawing/2014/main" id="{9DADD19B-875E-F74D-B6E7-DDEE62ED51BE}"/>
+                  </a:ext>
+                </a:extLst>
+              </p:cNvPr>
+              <p:cNvSpPr/>
+              <p:nvPr/>
+            </p:nvSpPr>
+            <p:spPr>
+              <a:xfrm>
+                <a:off x="3380135" y="246966"/>
+                <a:ext cx="2875265" cy="5693107"/>
+              </a:xfrm>
+              <a:prstGeom prst="roundRect">
+                <a:avLst/>
+              </a:prstGeom>
               <a:solidFill>
                 <a:schemeClr val="tx1"/>
               </a:solidFill>
+              <a:ln>
+                <a:solidFill>
+                  <a:schemeClr val="tx1"/>
+                </a:solidFill>
+              </a:ln>
+            </p:spPr>
+            <p:style>
+              <a:lnRef idx="2">
+                <a:schemeClr val="accent1">
+                  <a:shade val="50000"/>
+                </a:schemeClr>
+              </a:lnRef>
+              <a:fillRef idx="1">
+                <a:schemeClr val="accent1"/>
+              </a:fillRef>
+              <a:effectRef idx="0">
+                <a:schemeClr val="accent1"/>
+              </a:effectRef>
+              <a:fontRef idx="minor">
+                <a:schemeClr val="lt1"/>
+              </a:fontRef>
+            </p:style>
+            <p:txBody>
+              <a:bodyPr rtlCol="0" anchor="ctr"/>
+              <a:lstStyle/>
+              <a:p>
+                <a:pPr algn="ctr"/>
+                <a:endParaRPr lang="en-US"/>
+              </a:p>
+            </p:txBody>
+          </p:sp>
+          <p:sp>
+            <p:nvSpPr>
+              <p:cNvPr id="21" name="Rounded Rectangle 20">
+                <a:extLst>
+                  <a:ext uri="{FF2B5EF4-FFF2-40B4-BE49-F238E27FC236}">
+                    <a16:creationId xmlns:a16="http://schemas.microsoft.com/office/drawing/2014/main" id="{ABD22F0A-E2DD-4144-926F-E298BCB3BF0C}"/>
+                  </a:ext>
+                </a:extLst>
+              </p:cNvPr>
+              <p:cNvSpPr/>
+              <p:nvPr/>
+            </p:nvSpPr>
+            <p:spPr>
+              <a:xfrm>
+                <a:off x="3345314" y="1206298"/>
+                <a:ext cx="119627" cy="326101"/>
+              </a:xfrm>
+              <a:prstGeom prst="roundRect">
+                <a:avLst>
+                  <a:gd name="adj" fmla="val 41146"/>
+                </a:avLst>
+              </a:prstGeom>
+              <a:solidFill>
+                <a:schemeClr val="tx1"/>
+              </a:solidFill>
+              <a:ln>
+                <a:solidFill>
+                  <a:schemeClr val="tx1"/>
+                </a:solidFill>
+              </a:ln>
+            </p:spPr>
+            <p:style>
+              <a:lnRef idx="2">
+                <a:schemeClr val="accent1">
+                  <a:shade val="50000"/>
+                </a:schemeClr>
+              </a:lnRef>
+              <a:fillRef idx="1">
+                <a:schemeClr val="accent1"/>
+              </a:fillRef>
+              <a:effectRef idx="0">
+                <a:schemeClr val="accent1"/>
+              </a:effectRef>
+              <a:fontRef idx="minor">
+                <a:schemeClr val="lt1"/>
+              </a:fontRef>
+            </p:style>
+            <p:txBody>
+              <a:bodyPr rtlCol="0" anchor="ctr"/>
+              <a:lstStyle/>
+              <a:p>
+                <a:pPr algn="ctr"/>
+                <a:endParaRPr lang="en-US"/>
+              </a:p>
+            </p:txBody>
+          </p:sp>
+          <p:sp>
+            <p:nvSpPr>
+              <p:cNvPr id="22" name="Rounded Rectangle 21">
+                <a:extLst>
+                  <a:ext uri="{FF2B5EF4-FFF2-40B4-BE49-F238E27FC236}">
+                    <a16:creationId xmlns:a16="http://schemas.microsoft.com/office/drawing/2014/main" id="{5CC780C4-4D60-224A-97AF-D62DF8526668}"/>
+                  </a:ext>
+                </a:extLst>
+              </p:cNvPr>
+              <p:cNvSpPr/>
+              <p:nvPr/>
+            </p:nvSpPr>
+            <p:spPr>
+              <a:xfrm>
+                <a:off x="6169729" y="1175962"/>
+                <a:ext cx="119627" cy="326101"/>
+              </a:xfrm>
+              <a:prstGeom prst="roundRect">
+                <a:avLst>
+                  <a:gd name="adj" fmla="val 41146"/>
+                </a:avLst>
+              </a:prstGeom>
+              <a:solidFill>
+                <a:schemeClr val="tx1"/>
+              </a:solidFill>
+              <a:ln>
+                <a:solidFill>
+                  <a:schemeClr val="tx1"/>
+                </a:solidFill>
+              </a:ln>
+            </p:spPr>
+            <p:style>
+              <a:lnRef idx="2">
+                <a:schemeClr val="accent1">
+                  <a:shade val="50000"/>
+                </a:schemeClr>
+              </a:lnRef>
+              <a:fillRef idx="1">
+                <a:schemeClr val="accent1"/>
+              </a:fillRef>
+              <a:effectRef idx="0">
+                <a:schemeClr val="accent1"/>
+              </a:effectRef>
+              <a:fontRef idx="minor">
+                <a:schemeClr val="lt1"/>
+              </a:fontRef>
+            </p:style>
+            <p:txBody>
+              <a:bodyPr rtlCol="0" anchor="ctr"/>
+              <a:lstStyle/>
+              <a:p>
+                <a:pPr algn="ctr"/>
+                <a:endParaRPr lang="en-US"/>
+              </a:p>
+            </p:txBody>
+          </p:sp>
+          <p:sp>
+            <p:nvSpPr>
+              <p:cNvPr id="23" name="Rounded Rectangle 22">
+                <a:extLst>
+                  <a:ext uri="{FF2B5EF4-FFF2-40B4-BE49-F238E27FC236}">
+                    <a16:creationId xmlns:a16="http://schemas.microsoft.com/office/drawing/2014/main" id="{3D56FD46-835A-B949-BDDB-879C5F7BF8B2}"/>
+                  </a:ext>
+                </a:extLst>
+              </p:cNvPr>
+              <p:cNvSpPr/>
+              <p:nvPr/>
+            </p:nvSpPr>
+            <p:spPr>
+              <a:xfrm>
+                <a:off x="3345314" y="1607511"/>
+                <a:ext cx="119627" cy="326101"/>
+              </a:xfrm>
+              <a:prstGeom prst="roundRect">
+                <a:avLst>
+                  <a:gd name="adj" fmla="val 41146"/>
+                </a:avLst>
+              </a:prstGeom>
+              <a:solidFill>
+                <a:schemeClr val="tx1"/>
+              </a:solidFill>
+              <a:ln>
+                <a:solidFill>
+                  <a:schemeClr val="tx1"/>
+                </a:solidFill>
+              </a:ln>
+            </p:spPr>
+            <p:style>
+              <a:lnRef idx="2">
+                <a:schemeClr val="accent1">
+                  <a:shade val="50000"/>
+                </a:schemeClr>
+              </a:lnRef>
+              <a:fillRef idx="1">
+                <a:schemeClr val="accent1"/>
+              </a:fillRef>
+              <a:effectRef idx="0">
+                <a:schemeClr val="accent1"/>
+              </a:effectRef>
+              <a:fontRef idx="minor">
+                <a:schemeClr val="lt1"/>
+              </a:fontRef>
+            </p:style>
+            <p:txBody>
+              <a:bodyPr rtlCol="0" anchor="ctr"/>
+              <a:lstStyle/>
+              <a:p>
+                <a:pPr algn="ctr"/>
+                <a:endParaRPr lang="en-US"/>
+              </a:p>
+            </p:txBody>
+          </p:sp>
+          <p:sp>
+            <p:nvSpPr>
+              <p:cNvPr id="24" name="Oval 23">
+                <a:extLst>
+                  <a:ext uri="{FF2B5EF4-FFF2-40B4-BE49-F238E27FC236}">
+                    <a16:creationId xmlns:a16="http://schemas.microsoft.com/office/drawing/2014/main" id="{56ECD87F-21EE-394C-8C65-C1F02BF81A52}"/>
+                  </a:ext>
+                </a:extLst>
+              </p:cNvPr>
+              <p:cNvSpPr/>
+              <p:nvPr/>
+            </p:nvSpPr>
+            <p:spPr>
+              <a:xfrm>
+                <a:off x="3602640" y="476655"/>
+                <a:ext cx="356518" cy="356518"/>
+              </a:xfrm>
+              <a:prstGeom prst="ellipse">
+                <a:avLst/>
+              </a:prstGeom>
+              <a:solidFill>
+                <a:schemeClr val="bg2">
+                  <a:lumMod val="90000"/>
+                </a:schemeClr>
+              </a:solidFill>
+              <a:ln>
+                <a:solidFill>
+                  <a:schemeClr val="tx1"/>
+                </a:solidFill>
+              </a:ln>
+            </p:spPr>
+            <p:style>
+              <a:lnRef idx="2">
+                <a:schemeClr val="accent1">
+                  <a:shade val="50000"/>
+                </a:schemeClr>
+              </a:lnRef>
+              <a:fillRef idx="1">
+                <a:schemeClr val="accent1"/>
+              </a:fillRef>
+              <a:effectRef idx="0">
+                <a:schemeClr val="accent1"/>
+              </a:effectRef>
+              <a:fontRef idx="minor">
+                <a:schemeClr val="lt1"/>
+              </a:fontRef>
+            </p:style>
+            <p:txBody>
+              <a:bodyPr rtlCol="0" anchor="ctr"/>
+              <a:lstStyle/>
+              <a:p>
+                <a:pPr algn="ctr"/>
+                <a:endParaRPr lang="en-US"/>
+              </a:p>
+            </p:txBody>
+          </p:sp>
+          <p:sp>
+            <p:nvSpPr>
+              <p:cNvPr id="25" name="Oval 24">
+                <a:extLst>
+                  <a:ext uri="{FF2B5EF4-FFF2-40B4-BE49-F238E27FC236}">
+                    <a16:creationId xmlns:a16="http://schemas.microsoft.com/office/drawing/2014/main" id="{3118643E-6A03-014D-9D5D-A8CD661A1752}"/>
+                  </a:ext>
+                </a:extLst>
+              </p:cNvPr>
+              <p:cNvSpPr/>
+              <p:nvPr/>
+            </p:nvSpPr>
+            <p:spPr>
+              <a:xfrm>
+                <a:off x="4031132" y="476655"/>
+                <a:ext cx="356518" cy="356518"/>
+              </a:xfrm>
+              <a:prstGeom prst="ellipse">
+                <a:avLst/>
+              </a:prstGeom>
+              <a:solidFill>
+                <a:schemeClr val="bg2">
+                  <a:lumMod val="90000"/>
+                </a:schemeClr>
+              </a:solidFill>
+              <a:ln>
+                <a:solidFill>
+                  <a:schemeClr val="tx1"/>
+                </a:solidFill>
+              </a:ln>
+            </p:spPr>
+            <p:style>
+              <a:lnRef idx="2">
+                <a:schemeClr val="accent1">
+                  <a:shade val="50000"/>
+                </a:schemeClr>
+              </a:lnRef>
+              <a:fillRef idx="1">
+                <a:schemeClr val="accent1"/>
+              </a:fillRef>
+              <a:effectRef idx="0">
+                <a:schemeClr val="accent1"/>
+              </a:effectRef>
+              <a:fontRef idx="minor">
+                <a:schemeClr val="lt1"/>
+              </a:fontRef>
+            </p:style>
+            <p:txBody>
+              <a:bodyPr rtlCol="0" anchor="ctr"/>
+              <a:lstStyle/>
+              <a:p>
+                <a:pPr algn="ctr"/>
+                <a:endParaRPr lang="en-US"/>
+              </a:p>
+            </p:txBody>
+          </p:sp>
+          <p:sp>
+            <p:nvSpPr>
+              <p:cNvPr id="26" name="Oval 25">
+                <a:extLst>
+                  <a:ext uri="{FF2B5EF4-FFF2-40B4-BE49-F238E27FC236}">
+                    <a16:creationId xmlns:a16="http://schemas.microsoft.com/office/drawing/2014/main" id="{01D2F59C-FC5E-6543-903E-AD4ADB92792B}"/>
+                  </a:ext>
+                </a:extLst>
+              </p:cNvPr>
+              <p:cNvSpPr/>
+              <p:nvPr/>
+            </p:nvSpPr>
+            <p:spPr>
+              <a:xfrm>
+                <a:off x="3636463" y="510478"/>
+                <a:ext cx="288872" cy="288872"/>
+              </a:xfrm>
+              <a:prstGeom prst="ellipse">
+                <a:avLst/>
+              </a:prstGeom>
+              <a:solidFill>
+                <a:schemeClr val="bg2">
+                  <a:lumMod val="50000"/>
+                </a:schemeClr>
+              </a:solidFill>
+              <a:ln>
+                <a:solidFill>
+                  <a:schemeClr val="tx1"/>
+                </a:solidFill>
+              </a:ln>
+            </p:spPr>
+            <p:style>
+              <a:lnRef idx="2">
+                <a:schemeClr val="accent1">
+                  <a:shade val="50000"/>
+                </a:schemeClr>
+              </a:lnRef>
+              <a:fillRef idx="1">
+                <a:schemeClr val="accent1"/>
+              </a:fillRef>
+              <a:effectRef idx="0">
+                <a:schemeClr val="accent1"/>
+              </a:effectRef>
+              <a:fontRef idx="minor">
+                <a:schemeClr val="lt1"/>
+              </a:fontRef>
+            </p:style>
+            <p:txBody>
+              <a:bodyPr rtlCol="0" anchor="ctr"/>
+              <a:lstStyle/>
+              <a:p>
+                <a:pPr algn="ctr"/>
+                <a:endParaRPr lang="en-US"/>
+              </a:p>
+            </p:txBody>
+          </p:sp>
+          <p:sp>
+            <p:nvSpPr>
+              <p:cNvPr id="27" name="Oval 26">
+                <a:extLst>
+                  <a:ext uri="{FF2B5EF4-FFF2-40B4-BE49-F238E27FC236}">
+                    <a16:creationId xmlns:a16="http://schemas.microsoft.com/office/drawing/2014/main" id="{F9E71862-F304-4346-8222-5FEAD42B382E}"/>
+                  </a:ext>
+                </a:extLst>
+              </p:cNvPr>
+              <p:cNvSpPr/>
+              <p:nvPr/>
+            </p:nvSpPr>
+            <p:spPr>
+              <a:xfrm>
+                <a:off x="4064955" y="510478"/>
+                <a:ext cx="288872" cy="288872"/>
+              </a:xfrm>
+              <a:prstGeom prst="ellipse">
+                <a:avLst/>
+              </a:prstGeom>
+              <a:solidFill>
+                <a:schemeClr val="bg2">
+                  <a:lumMod val="50000"/>
+                </a:schemeClr>
+              </a:solidFill>
+              <a:ln>
+                <a:solidFill>
+                  <a:schemeClr val="tx1"/>
+                </a:solidFill>
+              </a:ln>
+            </p:spPr>
+            <p:style>
+              <a:lnRef idx="2">
+                <a:schemeClr val="accent1">
+                  <a:shade val="50000"/>
+                </a:schemeClr>
+              </a:lnRef>
+              <a:fillRef idx="1">
+                <a:schemeClr val="accent1"/>
+              </a:fillRef>
+              <a:effectRef idx="0">
+                <a:schemeClr val="accent1"/>
+              </a:effectRef>
+              <a:fontRef idx="minor">
+                <a:schemeClr val="lt1"/>
+              </a:fontRef>
+            </p:style>
+            <p:txBody>
+              <a:bodyPr rtlCol="0" anchor="ctr"/>
+              <a:lstStyle/>
+              <a:p>
+                <a:pPr algn="ctr"/>
+                <a:endParaRPr lang="en-US"/>
+              </a:p>
+            </p:txBody>
+          </p:sp>
+          <p:sp>
+            <p:nvSpPr>
+              <p:cNvPr id="28" name="Oval 27">
+                <a:extLst>
+                  <a:ext uri="{FF2B5EF4-FFF2-40B4-BE49-F238E27FC236}">
+                    <a16:creationId xmlns:a16="http://schemas.microsoft.com/office/drawing/2014/main" id="{430E2BEC-533B-9742-9093-A0E355CFBA2B}"/>
+                  </a:ext>
+                </a:extLst>
+              </p:cNvPr>
+              <p:cNvSpPr/>
+              <p:nvPr/>
+            </p:nvSpPr>
+            <p:spPr>
+              <a:xfrm>
+                <a:off x="3742446" y="616462"/>
+                <a:ext cx="75140" cy="75140"/>
+              </a:xfrm>
+              <a:prstGeom prst="ellipse">
+                <a:avLst/>
+              </a:prstGeom>
+              <a:solidFill>
+                <a:schemeClr val="bg2">
+                  <a:lumMod val="90000"/>
+                </a:schemeClr>
+              </a:solidFill>
+              <a:ln>
+                <a:solidFill>
+                  <a:schemeClr val="tx1"/>
+                </a:solidFill>
+              </a:ln>
+            </p:spPr>
+            <p:style>
+              <a:lnRef idx="2">
+                <a:schemeClr val="accent1">
+                  <a:shade val="50000"/>
+                </a:schemeClr>
+              </a:lnRef>
+              <a:fillRef idx="1">
+                <a:schemeClr val="accent1"/>
+              </a:fillRef>
+              <a:effectRef idx="0">
+                <a:schemeClr val="accent1"/>
+              </a:effectRef>
+              <a:fontRef idx="minor">
+                <a:schemeClr val="lt1"/>
+              </a:fontRef>
+            </p:style>
+            <p:txBody>
+              <a:bodyPr rtlCol="0" anchor="ctr"/>
+              <a:lstStyle/>
+              <a:p>
+                <a:pPr algn="ctr"/>
+                <a:endParaRPr lang="en-US"/>
+              </a:p>
+            </p:txBody>
+          </p:sp>
+          <p:sp>
+            <p:nvSpPr>
+              <p:cNvPr id="29" name="Oval 28">
+                <a:extLst>
+                  <a:ext uri="{FF2B5EF4-FFF2-40B4-BE49-F238E27FC236}">
+                    <a16:creationId xmlns:a16="http://schemas.microsoft.com/office/drawing/2014/main" id="{7D855430-FCA2-7245-93E0-8E28FACFACA2}"/>
+                  </a:ext>
+                </a:extLst>
+              </p:cNvPr>
+              <p:cNvSpPr/>
+              <p:nvPr/>
+            </p:nvSpPr>
+            <p:spPr>
+              <a:xfrm>
+                <a:off x="4171821" y="616693"/>
+                <a:ext cx="75140" cy="75140"/>
+              </a:xfrm>
+              <a:prstGeom prst="ellipse">
+                <a:avLst/>
+              </a:prstGeom>
+              <a:solidFill>
+                <a:schemeClr val="bg2">
+                  <a:lumMod val="90000"/>
+                </a:schemeClr>
+              </a:solidFill>
+              <a:ln>
+                <a:solidFill>
+                  <a:schemeClr val="tx1"/>
+                </a:solidFill>
+              </a:ln>
+            </p:spPr>
+            <p:style>
+              <a:lnRef idx="2">
+                <a:schemeClr val="accent1">
+                  <a:shade val="50000"/>
+                </a:schemeClr>
+              </a:lnRef>
+              <a:fillRef idx="1">
+                <a:schemeClr val="accent1"/>
+              </a:fillRef>
+              <a:effectRef idx="0">
+                <a:schemeClr val="accent1"/>
+              </a:effectRef>
+              <a:fontRef idx="minor">
+                <a:schemeClr val="lt1"/>
+              </a:fontRef>
+            </p:style>
+            <p:txBody>
+              <a:bodyPr rtlCol="0" anchor="ctr"/>
+              <a:lstStyle/>
+              <a:p>
+                <a:pPr algn="ctr"/>
+                <a:endParaRPr lang="en-US"/>
+              </a:p>
+            </p:txBody>
+          </p:sp>
+          <p:sp>
+            <p:nvSpPr>
+              <p:cNvPr id="30" name="Oval 29">
+                <a:extLst>
+                  <a:ext uri="{FF2B5EF4-FFF2-40B4-BE49-F238E27FC236}">
+                    <a16:creationId xmlns:a16="http://schemas.microsoft.com/office/drawing/2014/main" id="{939A6C29-BCF7-0C46-93B9-BDB4BDAC4B1B}"/>
+                  </a:ext>
+                </a:extLst>
+              </p:cNvPr>
+              <p:cNvSpPr/>
+              <p:nvPr/>
+            </p:nvSpPr>
+            <p:spPr>
+              <a:xfrm>
+                <a:off x="3757156" y="631172"/>
+                <a:ext cx="45719" cy="45719"/>
+              </a:xfrm>
+              <a:prstGeom prst="ellipse">
+                <a:avLst/>
+              </a:prstGeom>
+              <a:solidFill>
+                <a:schemeClr val="tx1">
+                  <a:lumMod val="85000"/>
+                  <a:lumOff val="15000"/>
+                </a:schemeClr>
+              </a:solidFill>
+              <a:ln>
+                <a:noFill/>
+              </a:ln>
+            </p:spPr>
+            <p:style>
+              <a:lnRef idx="2">
+                <a:schemeClr val="accent1">
+                  <a:shade val="50000"/>
+                </a:schemeClr>
+              </a:lnRef>
+              <a:fillRef idx="1">
+                <a:schemeClr val="accent1"/>
+              </a:fillRef>
+              <a:effectRef idx="0">
+                <a:schemeClr val="accent1"/>
+              </a:effectRef>
+              <a:fontRef idx="minor">
+                <a:schemeClr val="lt1"/>
+              </a:fontRef>
+            </p:style>
+            <p:txBody>
+              <a:bodyPr rtlCol="0" anchor="ctr"/>
+              <a:lstStyle/>
+              <a:p>
+                <a:pPr algn="ctr"/>
+                <a:endParaRPr lang="en-US"/>
+              </a:p>
+            </p:txBody>
+          </p:sp>
+          <p:sp>
+            <p:nvSpPr>
+              <p:cNvPr id="31" name="Oval 30">
+                <a:extLst>
+                  <a:ext uri="{FF2B5EF4-FFF2-40B4-BE49-F238E27FC236}">
+                    <a16:creationId xmlns:a16="http://schemas.microsoft.com/office/drawing/2014/main" id="{3E7CAC3B-0589-5E4E-B57B-ABA027BDA37A}"/>
+                  </a:ext>
+                </a:extLst>
+              </p:cNvPr>
+              <p:cNvSpPr/>
+              <p:nvPr/>
+            </p:nvSpPr>
+            <p:spPr>
+              <a:xfrm>
+                <a:off x="4186531" y="631153"/>
+                <a:ext cx="45719" cy="45719"/>
+              </a:xfrm>
+              <a:prstGeom prst="ellipse">
+                <a:avLst/>
+              </a:prstGeom>
+              <a:solidFill>
+                <a:schemeClr val="tx1">
+                  <a:lumMod val="85000"/>
+                  <a:lumOff val="15000"/>
+                </a:schemeClr>
+              </a:solidFill>
+              <a:ln>
+                <a:noFill/>
+              </a:ln>
+            </p:spPr>
+            <p:style>
+              <a:lnRef idx="2">
+                <a:schemeClr val="accent1">
+                  <a:shade val="50000"/>
+                </a:schemeClr>
+              </a:lnRef>
+              <a:fillRef idx="1">
+                <a:schemeClr val="accent1"/>
+              </a:fillRef>
+              <a:effectRef idx="0">
+                <a:schemeClr val="accent1"/>
+              </a:effectRef>
+              <a:fontRef idx="minor">
+                <a:schemeClr val="lt1"/>
+              </a:fontRef>
+            </p:style>
+            <p:txBody>
+              <a:bodyPr rtlCol="0" anchor="ctr"/>
+              <a:lstStyle/>
+              <a:p>
+                <a:pPr algn="ctr"/>
+                <a:endParaRPr lang="en-US"/>
+              </a:p>
+            </p:txBody>
+          </p:sp>
+        </p:grpSp>
+        <p:sp>
+          <p:nvSpPr>
+            <p:cNvPr id="32" name="Rectangle 31">
+              <a:extLst>
+                <a:ext uri="{FF2B5EF4-FFF2-40B4-BE49-F238E27FC236}">
+                  <a16:creationId xmlns:a16="http://schemas.microsoft.com/office/drawing/2014/main" id="{45420398-BCF1-5245-988F-8527399B1BA4}"/>
+                </a:ext>
+              </a:extLst>
+            </p:cNvPr>
+            <p:cNvSpPr/>
+            <p:nvPr/>
+          </p:nvSpPr>
+          <p:spPr>
+            <a:xfrm>
+              <a:off x="7606929" y="246965"/>
+              <a:ext cx="2944042" cy="5693108"/>
+            </a:xfrm>
+            <a:prstGeom prst="rect">
+              <a:avLst/>
+            </a:prstGeom>
+            <a:noFill/>
+            <a:ln w="28575">
+              <a:solidFill>
+                <a:srgbClr val="C00000"/>
+              </a:solidFill>
             </a:ln>
           </p:spPr>
           <p:style>
@@ -12110,673 +12860,7 @@
             </a:p>
           </p:txBody>
         </p:sp>
-        <p:sp>
-          <p:nvSpPr>
-            <p:cNvPr id="21" name="Rounded Rectangle 20">
-              <a:extLst>
-                <a:ext uri="{FF2B5EF4-FFF2-40B4-BE49-F238E27FC236}">
-                  <a16:creationId xmlns:a16="http://schemas.microsoft.com/office/drawing/2014/main" id="{ABD22F0A-E2DD-4144-926F-E298BCB3BF0C}"/>
-                </a:ext>
-              </a:extLst>
-            </p:cNvPr>
-            <p:cNvSpPr/>
-            <p:nvPr/>
-          </p:nvSpPr>
-          <p:spPr>
-            <a:xfrm>
-              <a:off x="3345314" y="1206298"/>
-              <a:ext cx="119627" cy="326101"/>
-            </a:xfrm>
-            <a:prstGeom prst="roundRect">
-              <a:avLst>
-                <a:gd name="adj" fmla="val 41146"/>
-              </a:avLst>
-            </a:prstGeom>
-            <a:solidFill>
-              <a:schemeClr val="tx1"/>
-            </a:solidFill>
-            <a:ln>
-              <a:solidFill>
-                <a:schemeClr val="tx1"/>
-              </a:solidFill>
-            </a:ln>
-          </p:spPr>
-          <p:style>
-            <a:lnRef idx="2">
-              <a:schemeClr val="accent1">
-                <a:shade val="50000"/>
-              </a:schemeClr>
-            </a:lnRef>
-            <a:fillRef idx="1">
-              <a:schemeClr val="accent1"/>
-            </a:fillRef>
-            <a:effectRef idx="0">
-              <a:schemeClr val="accent1"/>
-            </a:effectRef>
-            <a:fontRef idx="minor">
-              <a:schemeClr val="lt1"/>
-            </a:fontRef>
-          </p:style>
-          <p:txBody>
-            <a:bodyPr rtlCol="0" anchor="ctr"/>
-            <a:lstStyle/>
-            <a:p>
-              <a:pPr algn="ctr"/>
-              <a:endParaRPr lang="en-US"/>
-            </a:p>
-          </p:txBody>
-        </p:sp>
-        <p:sp>
-          <p:nvSpPr>
-            <p:cNvPr id="22" name="Rounded Rectangle 21">
-              <a:extLst>
-                <a:ext uri="{FF2B5EF4-FFF2-40B4-BE49-F238E27FC236}">
-                  <a16:creationId xmlns:a16="http://schemas.microsoft.com/office/drawing/2014/main" id="{5CC780C4-4D60-224A-97AF-D62DF8526668}"/>
-                </a:ext>
-              </a:extLst>
-            </p:cNvPr>
-            <p:cNvSpPr/>
-            <p:nvPr/>
-          </p:nvSpPr>
-          <p:spPr>
-            <a:xfrm>
-              <a:off x="6169729" y="1175962"/>
-              <a:ext cx="119627" cy="326101"/>
-            </a:xfrm>
-            <a:prstGeom prst="roundRect">
-              <a:avLst>
-                <a:gd name="adj" fmla="val 41146"/>
-              </a:avLst>
-            </a:prstGeom>
-            <a:solidFill>
-              <a:schemeClr val="tx1"/>
-            </a:solidFill>
-            <a:ln>
-              <a:solidFill>
-                <a:schemeClr val="tx1"/>
-              </a:solidFill>
-            </a:ln>
-          </p:spPr>
-          <p:style>
-            <a:lnRef idx="2">
-              <a:schemeClr val="accent1">
-                <a:shade val="50000"/>
-              </a:schemeClr>
-            </a:lnRef>
-            <a:fillRef idx="1">
-              <a:schemeClr val="accent1"/>
-            </a:fillRef>
-            <a:effectRef idx="0">
-              <a:schemeClr val="accent1"/>
-            </a:effectRef>
-            <a:fontRef idx="minor">
-              <a:schemeClr val="lt1"/>
-            </a:fontRef>
-          </p:style>
-          <p:txBody>
-            <a:bodyPr rtlCol="0" anchor="ctr"/>
-            <a:lstStyle/>
-            <a:p>
-              <a:pPr algn="ctr"/>
-              <a:endParaRPr lang="en-US"/>
-            </a:p>
-          </p:txBody>
-        </p:sp>
-        <p:sp>
-          <p:nvSpPr>
-            <p:cNvPr id="23" name="Rounded Rectangle 22">
-              <a:extLst>
-                <a:ext uri="{FF2B5EF4-FFF2-40B4-BE49-F238E27FC236}">
-                  <a16:creationId xmlns:a16="http://schemas.microsoft.com/office/drawing/2014/main" id="{3D56FD46-835A-B949-BDDB-879C5F7BF8B2}"/>
-                </a:ext>
-              </a:extLst>
-            </p:cNvPr>
-            <p:cNvSpPr/>
-            <p:nvPr/>
-          </p:nvSpPr>
-          <p:spPr>
-            <a:xfrm>
-              <a:off x="3345314" y="1607511"/>
-              <a:ext cx="119627" cy="326101"/>
-            </a:xfrm>
-            <a:prstGeom prst="roundRect">
-              <a:avLst>
-                <a:gd name="adj" fmla="val 41146"/>
-              </a:avLst>
-            </a:prstGeom>
-            <a:solidFill>
-              <a:schemeClr val="tx1"/>
-            </a:solidFill>
-            <a:ln>
-              <a:solidFill>
-                <a:schemeClr val="tx1"/>
-              </a:solidFill>
-            </a:ln>
-          </p:spPr>
-          <p:style>
-            <a:lnRef idx="2">
-              <a:schemeClr val="accent1">
-                <a:shade val="50000"/>
-              </a:schemeClr>
-            </a:lnRef>
-            <a:fillRef idx="1">
-              <a:schemeClr val="accent1"/>
-            </a:fillRef>
-            <a:effectRef idx="0">
-              <a:schemeClr val="accent1"/>
-            </a:effectRef>
-            <a:fontRef idx="minor">
-              <a:schemeClr val="lt1"/>
-            </a:fontRef>
-          </p:style>
-          <p:txBody>
-            <a:bodyPr rtlCol="0" anchor="ctr"/>
-            <a:lstStyle/>
-            <a:p>
-              <a:pPr algn="ctr"/>
-              <a:endParaRPr lang="en-US"/>
-            </a:p>
-          </p:txBody>
-        </p:sp>
-        <p:sp>
-          <p:nvSpPr>
-            <p:cNvPr id="24" name="Oval 23">
-              <a:extLst>
-                <a:ext uri="{FF2B5EF4-FFF2-40B4-BE49-F238E27FC236}">
-                  <a16:creationId xmlns:a16="http://schemas.microsoft.com/office/drawing/2014/main" id="{56ECD87F-21EE-394C-8C65-C1F02BF81A52}"/>
-                </a:ext>
-              </a:extLst>
-            </p:cNvPr>
-            <p:cNvSpPr/>
-            <p:nvPr/>
-          </p:nvSpPr>
-          <p:spPr>
-            <a:xfrm>
-              <a:off x="3602640" y="476655"/>
-              <a:ext cx="356518" cy="356518"/>
-            </a:xfrm>
-            <a:prstGeom prst="ellipse">
-              <a:avLst/>
-            </a:prstGeom>
-            <a:solidFill>
-              <a:schemeClr val="bg2">
-                <a:lumMod val="90000"/>
-              </a:schemeClr>
-            </a:solidFill>
-            <a:ln>
-              <a:solidFill>
-                <a:schemeClr val="tx1"/>
-              </a:solidFill>
-            </a:ln>
-          </p:spPr>
-          <p:style>
-            <a:lnRef idx="2">
-              <a:schemeClr val="accent1">
-                <a:shade val="50000"/>
-              </a:schemeClr>
-            </a:lnRef>
-            <a:fillRef idx="1">
-              <a:schemeClr val="accent1"/>
-            </a:fillRef>
-            <a:effectRef idx="0">
-              <a:schemeClr val="accent1"/>
-            </a:effectRef>
-            <a:fontRef idx="minor">
-              <a:schemeClr val="lt1"/>
-            </a:fontRef>
-          </p:style>
-          <p:txBody>
-            <a:bodyPr rtlCol="0" anchor="ctr"/>
-            <a:lstStyle/>
-            <a:p>
-              <a:pPr algn="ctr"/>
-              <a:endParaRPr lang="en-US"/>
-            </a:p>
-          </p:txBody>
-        </p:sp>
-        <p:sp>
-          <p:nvSpPr>
-            <p:cNvPr id="25" name="Oval 24">
-              <a:extLst>
-                <a:ext uri="{FF2B5EF4-FFF2-40B4-BE49-F238E27FC236}">
-                  <a16:creationId xmlns:a16="http://schemas.microsoft.com/office/drawing/2014/main" id="{3118643E-6A03-014D-9D5D-A8CD661A1752}"/>
-                </a:ext>
-              </a:extLst>
-            </p:cNvPr>
-            <p:cNvSpPr/>
-            <p:nvPr/>
-          </p:nvSpPr>
-          <p:spPr>
-            <a:xfrm>
-              <a:off x="4031132" y="476655"/>
-              <a:ext cx="356518" cy="356518"/>
-            </a:xfrm>
-            <a:prstGeom prst="ellipse">
-              <a:avLst/>
-            </a:prstGeom>
-            <a:solidFill>
-              <a:schemeClr val="bg2">
-                <a:lumMod val="90000"/>
-              </a:schemeClr>
-            </a:solidFill>
-            <a:ln>
-              <a:solidFill>
-                <a:schemeClr val="tx1"/>
-              </a:solidFill>
-            </a:ln>
-          </p:spPr>
-          <p:style>
-            <a:lnRef idx="2">
-              <a:schemeClr val="accent1">
-                <a:shade val="50000"/>
-              </a:schemeClr>
-            </a:lnRef>
-            <a:fillRef idx="1">
-              <a:schemeClr val="accent1"/>
-            </a:fillRef>
-            <a:effectRef idx="0">
-              <a:schemeClr val="accent1"/>
-            </a:effectRef>
-            <a:fontRef idx="minor">
-              <a:schemeClr val="lt1"/>
-            </a:fontRef>
-          </p:style>
-          <p:txBody>
-            <a:bodyPr rtlCol="0" anchor="ctr"/>
-            <a:lstStyle/>
-            <a:p>
-              <a:pPr algn="ctr"/>
-              <a:endParaRPr lang="en-US"/>
-            </a:p>
-          </p:txBody>
-        </p:sp>
-        <p:sp>
-          <p:nvSpPr>
-            <p:cNvPr id="26" name="Oval 25">
-              <a:extLst>
-                <a:ext uri="{FF2B5EF4-FFF2-40B4-BE49-F238E27FC236}">
-                  <a16:creationId xmlns:a16="http://schemas.microsoft.com/office/drawing/2014/main" id="{01D2F59C-FC5E-6543-903E-AD4ADB92792B}"/>
-                </a:ext>
-              </a:extLst>
-            </p:cNvPr>
-            <p:cNvSpPr/>
-            <p:nvPr/>
-          </p:nvSpPr>
-          <p:spPr>
-            <a:xfrm>
-              <a:off x="3636463" y="510478"/>
-              <a:ext cx="288872" cy="288872"/>
-            </a:xfrm>
-            <a:prstGeom prst="ellipse">
-              <a:avLst/>
-            </a:prstGeom>
-            <a:solidFill>
-              <a:schemeClr val="bg2">
-                <a:lumMod val="50000"/>
-              </a:schemeClr>
-            </a:solidFill>
-            <a:ln>
-              <a:solidFill>
-                <a:schemeClr val="tx1"/>
-              </a:solidFill>
-            </a:ln>
-          </p:spPr>
-          <p:style>
-            <a:lnRef idx="2">
-              <a:schemeClr val="accent1">
-                <a:shade val="50000"/>
-              </a:schemeClr>
-            </a:lnRef>
-            <a:fillRef idx="1">
-              <a:schemeClr val="accent1"/>
-            </a:fillRef>
-            <a:effectRef idx="0">
-              <a:schemeClr val="accent1"/>
-            </a:effectRef>
-            <a:fontRef idx="minor">
-              <a:schemeClr val="lt1"/>
-            </a:fontRef>
-          </p:style>
-          <p:txBody>
-            <a:bodyPr rtlCol="0" anchor="ctr"/>
-            <a:lstStyle/>
-            <a:p>
-              <a:pPr algn="ctr"/>
-              <a:endParaRPr lang="en-US"/>
-            </a:p>
-          </p:txBody>
-        </p:sp>
-        <p:sp>
-          <p:nvSpPr>
-            <p:cNvPr id="27" name="Oval 26">
-              <a:extLst>
-                <a:ext uri="{FF2B5EF4-FFF2-40B4-BE49-F238E27FC236}">
-                  <a16:creationId xmlns:a16="http://schemas.microsoft.com/office/drawing/2014/main" id="{F9E71862-F304-4346-8222-5FEAD42B382E}"/>
-                </a:ext>
-              </a:extLst>
-            </p:cNvPr>
-            <p:cNvSpPr/>
-            <p:nvPr/>
-          </p:nvSpPr>
-          <p:spPr>
-            <a:xfrm>
-              <a:off x="4064955" y="510478"/>
-              <a:ext cx="288872" cy="288872"/>
-            </a:xfrm>
-            <a:prstGeom prst="ellipse">
-              <a:avLst/>
-            </a:prstGeom>
-            <a:solidFill>
-              <a:schemeClr val="bg2">
-                <a:lumMod val="50000"/>
-              </a:schemeClr>
-            </a:solidFill>
-            <a:ln>
-              <a:solidFill>
-                <a:schemeClr val="tx1"/>
-              </a:solidFill>
-            </a:ln>
-          </p:spPr>
-          <p:style>
-            <a:lnRef idx="2">
-              <a:schemeClr val="accent1">
-                <a:shade val="50000"/>
-              </a:schemeClr>
-            </a:lnRef>
-            <a:fillRef idx="1">
-              <a:schemeClr val="accent1"/>
-            </a:fillRef>
-            <a:effectRef idx="0">
-              <a:schemeClr val="accent1"/>
-            </a:effectRef>
-            <a:fontRef idx="minor">
-              <a:schemeClr val="lt1"/>
-            </a:fontRef>
-          </p:style>
-          <p:txBody>
-            <a:bodyPr rtlCol="0" anchor="ctr"/>
-            <a:lstStyle/>
-            <a:p>
-              <a:pPr algn="ctr"/>
-              <a:endParaRPr lang="en-US"/>
-            </a:p>
-          </p:txBody>
-        </p:sp>
-        <p:sp>
-          <p:nvSpPr>
-            <p:cNvPr id="28" name="Oval 27">
-              <a:extLst>
-                <a:ext uri="{FF2B5EF4-FFF2-40B4-BE49-F238E27FC236}">
-                  <a16:creationId xmlns:a16="http://schemas.microsoft.com/office/drawing/2014/main" id="{430E2BEC-533B-9742-9093-A0E355CFBA2B}"/>
-                </a:ext>
-              </a:extLst>
-            </p:cNvPr>
-            <p:cNvSpPr/>
-            <p:nvPr/>
-          </p:nvSpPr>
-          <p:spPr>
-            <a:xfrm>
-              <a:off x="3742446" y="616462"/>
-              <a:ext cx="75140" cy="75140"/>
-            </a:xfrm>
-            <a:prstGeom prst="ellipse">
-              <a:avLst/>
-            </a:prstGeom>
-            <a:solidFill>
-              <a:schemeClr val="bg2">
-                <a:lumMod val="90000"/>
-              </a:schemeClr>
-            </a:solidFill>
-            <a:ln>
-              <a:solidFill>
-                <a:schemeClr val="tx1"/>
-              </a:solidFill>
-            </a:ln>
-          </p:spPr>
-          <p:style>
-            <a:lnRef idx="2">
-              <a:schemeClr val="accent1">
-                <a:shade val="50000"/>
-              </a:schemeClr>
-            </a:lnRef>
-            <a:fillRef idx="1">
-              <a:schemeClr val="accent1"/>
-            </a:fillRef>
-            <a:effectRef idx="0">
-              <a:schemeClr val="accent1"/>
-            </a:effectRef>
-            <a:fontRef idx="minor">
-              <a:schemeClr val="lt1"/>
-            </a:fontRef>
-          </p:style>
-          <p:txBody>
-            <a:bodyPr rtlCol="0" anchor="ctr"/>
-            <a:lstStyle/>
-            <a:p>
-              <a:pPr algn="ctr"/>
-              <a:endParaRPr lang="en-US"/>
-            </a:p>
-          </p:txBody>
-        </p:sp>
-        <p:sp>
-          <p:nvSpPr>
-            <p:cNvPr id="29" name="Oval 28">
-              <a:extLst>
-                <a:ext uri="{FF2B5EF4-FFF2-40B4-BE49-F238E27FC236}">
-                  <a16:creationId xmlns:a16="http://schemas.microsoft.com/office/drawing/2014/main" id="{7D855430-FCA2-7245-93E0-8E28FACFACA2}"/>
-                </a:ext>
-              </a:extLst>
-            </p:cNvPr>
-            <p:cNvSpPr/>
-            <p:nvPr/>
-          </p:nvSpPr>
-          <p:spPr>
-            <a:xfrm>
-              <a:off x="4171821" y="616693"/>
-              <a:ext cx="75140" cy="75140"/>
-            </a:xfrm>
-            <a:prstGeom prst="ellipse">
-              <a:avLst/>
-            </a:prstGeom>
-            <a:solidFill>
-              <a:schemeClr val="bg2">
-                <a:lumMod val="90000"/>
-              </a:schemeClr>
-            </a:solidFill>
-            <a:ln>
-              <a:solidFill>
-                <a:schemeClr val="tx1"/>
-              </a:solidFill>
-            </a:ln>
-          </p:spPr>
-          <p:style>
-            <a:lnRef idx="2">
-              <a:schemeClr val="accent1">
-                <a:shade val="50000"/>
-              </a:schemeClr>
-            </a:lnRef>
-            <a:fillRef idx="1">
-              <a:schemeClr val="accent1"/>
-            </a:fillRef>
-            <a:effectRef idx="0">
-              <a:schemeClr val="accent1"/>
-            </a:effectRef>
-            <a:fontRef idx="minor">
-              <a:schemeClr val="lt1"/>
-            </a:fontRef>
-          </p:style>
-          <p:txBody>
-            <a:bodyPr rtlCol="0" anchor="ctr"/>
-            <a:lstStyle/>
-            <a:p>
-              <a:pPr algn="ctr"/>
-              <a:endParaRPr lang="en-US"/>
-            </a:p>
-          </p:txBody>
-        </p:sp>
-        <p:sp>
-          <p:nvSpPr>
-            <p:cNvPr id="30" name="Oval 29">
-              <a:extLst>
-                <a:ext uri="{FF2B5EF4-FFF2-40B4-BE49-F238E27FC236}">
-                  <a16:creationId xmlns:a16="http://schemas.microsoft.com/office/drawing/2014/main" id="{939A6C29-BCF7-0C46-93B9-BDB4BDAC4B1B}"/>
-                </a:ext>
-              </a:extLst>
-            </p:cNvPr>
-            <p:cNvSpPr/>
-            <p:nvPr/>
-          </p:nvSpPr>
-          <p:spPr>
-            <a:xfrm>
-              <a:off x="3757156" y="631172"/>
-              <a:ext cx="45719" cy="45719"/>
-            </a:xfrm>
-            <a:prstGeom prst="ellipse">
-              <a:avLst/>
-            </a:prstGeom>
-            <a:solidFill>
-              <a:schemeClr val="tx1">
-                <a:lumMod val="85000"/>
-                <a:lumOff val="15000"/>
-              </a:schemeClr>
-            </a:solidFill>
-            <a:ln>
-              <a:noFill/>
-            </a:ln>
-          </p:spPr>
-          <p:style>
-            <a:lnRef idx="2">
-              <a:schemeClr val="accent1">
-                <a:shade val="50000"/>
-              </a:schemeClr>
-            </a:lnRef>
-            <a:fillRef idx="1">
-              <a:schemeClr val="accent1"/>
-            </a:fillRef>
-            <a:effectRef idx="0">
-              <a:schemeClr val="accent1"/>
-            </a:effectRef>
-            <a:fontRef idx="minor">
-              <a:schemeClr val="lt1"/>
-            </a:fontRef>
-          </p:style>
-          <p:txBody>
-            <a:bodyPr rtlCol="0" anchor="ctr"/>
-            <a:lstStyle/>
-            <a:p>
-              <a:pPr algn="ctr"/>
-              <a:endParaRPr lang="en-US"/>
-            </a:p>
-          </p:txBody>
-        </p:sp>
-        <p:sp>
-          <p:nvSpPr>
-            <p:cNvPr id="31" name="Oval 30">
-              <a:extLst>
-                <a:ext uri="{FF2B5EF4-FFF2-40B4-BE49-F238E27FC236}">
-                  <a16:creationId xmlns:a16="http://schemas.microsoft.com/office/drawing/2014/main" id="{3E7CAC3B-0589-5E4E-B57B-ABA027BDA37A}"/>
-                </a:ext>
-              </a:extLst>
-            </p:cNvPr>
-            <p:cNvSpPr/>
-            <p:nvPr/>
-          </p:nvSpPr>
-          <p:spPr>
-            <a:xfrm>
-              <a:off x="4186531" y="631153"/>
-              <a:ext cx="45719" cy="45719"/>
-            </a:xfrm>
-            <a:prstGeom prst="ellipse">
-              <a:avLst/>
-            </a:prstGeom>
-            <a:solidFill>
-              <a:schemeClr val="tx1">
-                <a:lumMod val="85000"/>
-                <a:lumOff val="15000"/>
-              </a:schemeClr>
-            </a:solidFill>
-            <a:ln>
-              <a:noFill/>
-            </a:ln>
-          </p:spPr>
-          <p:style>
-            <a:lnRef idx="2">
-              <a:schemeClr val="accent1">
-                <a:shade val="50000"/>
-              </a:schemeClr>
-            </a:lnRef>
-            <a:fillRef idx="1">
-              <a:schemeClr val="accent1"/>
-            </a:fillRef>
-            <a:effectRef idx="0">
-              <a:schemeClr val="accent1"/>
-            </a:effectRef>
-            <a:fontRef idx="minor">
-              <a:schemeClr val="lt1"/>
-            </a:fontRef>
-          </p:style>
-          <p:txBody>
-            <a:bodyPr rtlCol="0" anchor="ctr"/>
-            <a:lstStyle/>
-            <a:p>
-              <a:pPr algn="ctr"/>
-              <a:endParaRPr lang="en-US"/>
-            </a:p>
-          </p:txBody>
-        </p:sp>
       </p:grpSp>
-      <p:sp>
-        <p:nvSpPr>
-          <p:cNvPr id="32" name="Rectangle 31">
-            <a:extLst>
-              <a:ext uri="{FF2B5EF4-FFF2-40B4-BE49-F238E27FC236}">
-                <a16:creationId xmlns:a16="http://schemas.microsoft.com/office/drawing/2014/main" id="{45420398-BCF1-5245-988F-8527399B1BA4}"/>
-              </a:ext>
-            </a:extLst>
-          </p:cNvPr>
-          <p:cNvSpPr/>
-          <p:nvPr/>
-        </p:nvSpPr>
-        <p:spPr>
-          <a:xfrm>
-            <a:off x="7606929" y="246965"/>
-            <a:ext cx="2944042" cy="5693108"/>
-          </a:xfrm>
-          <a:prstGeom prst="rect">
-            <a:avLst/>
-          </a:prstGeom>
-          <a:noFill/>
-          <a:ln w="28575">
-            <a:solidFill>
-              <a:srgbClr val="C00000"/>
-            </a:solidFill>
-          </a:ln>
-        </p:spPr>
-        <p:style>
-          <a:lnRef idx="2">
-            <a:schemeClr val="accent1">
-              <a:shade val="50000"/>
-            </a:schemeClr>
-          </a:lnRef>
-          <a:fillRef idx="1">
-            <a:schemeClr val="accent1"/>
-          </a:fillRef>
-          <a:effectRef idx="0">
-            <a:schemeClr val="accent1"/>
-          </a:effectRef>
-          <a:fontRef idx="minor">
-            <a:schemeClr val="lt1"/>
-          </a:fontRef>
-        </p:style>
-        <p:txBody>
-          <a:bodyPr rtlCol="0" anchor="ctr"/>
-          <a:lstStyle/>
-          <a:p>
-            <a:pPr algn="ctr"/>
-            <a:endParaRPr lang="en-US"/>
-          </a:p>
-        </p:txBody>
-      </p:sp>
     </p:spTree>
     <p:extLst>
       <p:ext uri="{BB962C8B-B14F-4D97-AF65-F5344CB8AC3E}">

</xml_diff>